<commit_message>
update presentation (add templates and use bigger font)
</commit_message>
<xml_diff>
--- a/Unleashing the power of Powershell in VS-Code.pptx
+++ b/Unleashing the power of Powershell in VS-Code.pptx
@@ -5,7 +5,7 @@
     <p:sldMasterId id="2147483696" r:id="rId4"/>
   </p:sldMasterIdLst>
   <p:notesMasterIdLst>
-    <p:notesMasterId r:id="rId24"/>
+    <p:notesMasterId r:id="rId25"/>
   </p:notesMasterIdLst>
   <p:sldIdLst>
     <p:sldId id="306" r:id="rId5"/>
@@ -15,18 +15,19 @@
     <p:sldId id="308" r:id="rId9"/>
     <p:sldId id="326" r:id="rId10"/>
     <p:sldId id="322" r:id="rId11"/>
-    <p:sldId id="324" r:id="rId12"/>
-    <p:sldId id="325" r:id="rId13"/>
-    <p:sldId id="315" r:id="rId14"/>
-    <p:sldId id="327" r:id="rId15"/>
-    <p:sldId id="314" r:id="rId16"/>
-    <p:sldId id="316" r:id="rId17"/>
-    <p:sldId id="317" r:id="rId18"/>
-    <p:sldId id="309" r:id="rId19"/>
-    <p:sldId id="319" r:id="rId20"/>
-    <p:sldId id="320" r:id="rId21"/>
-    <p:sldId id="321" r:id="rId22"/>
-    <p:sldId id="312" r:id="rId23"/>
+    <p:sldId id="328" r:id="rId12"/>
+    <p:sldId id="324" r:id="rId13"/>
+    <p:sldId id="325" r:id="rId14"/>
+    <p:sldId id="315" r:id="rId15"/>
+    <p:sldId id="327" r:id="rId16"/>
+    <p:sldId id="314" r:id="rId17"/>
+    <p:sldId id="316" r:id="rId18"/>
+    <p:sldId id="317" r:id="rId19"/>
+    <p:sldId id="309" r:id="rId20"/>
+    <p:sldId id="319" r:id="rId21"/>
+    <p:sldId id="320" r:id="rId22"/>
+    <p:sldId id="321" r:id="rId23"/>
+    <p:sldId id="312" r:id="rId24"/>
   </p:sldIdLst>
   <p:sldSz cx="12192000" cy="6858000"/>
   <p:notesSz cx="6858000" cy="9144000"/>
@@ -237,7 +238,7 @@
           <a:p>
             <a:fld id="{5EA28068-AFBD-4979-B752-9EB6F90B1386}" type="datetimeFigureOut">
               <a:rPr lang="en-US" smtClean="0"/>
-              <a:t>3/2/2023</a:t>
+              <a:t>3/27/2023</a:t>
             </a:fld>
             <a:endParaRPr lang="en-US" dirty="0"/>
           </a:p>
@@ -11309,18 +11310,69 @@
       </p:grpSpPr>
       <p:sp>
         <p:nvSpPr>
-          <p:cNvPr id="3" name="Title 2">
-            <a:extLst>
-              <a:ext uri="{FF2B5EF4-FFF2-40B4-BE49-F238E27FC236}">
-                <a16:creationId xmlns:a16="http://schemas.microsoft.com/office/drawing/2014/main" id="{0115FF41-AFA4-4D25-AB42-AB034F4B4FEC}"/>
-              </a:ext>
-            </a:extLst>
-          </p:cNvPr>
-          <p:cNvSpPr>
-            <a:spLocks noGrp="1"/>
-          </p:cNvSpPr>
-          <p:nvPr>
-            <p:ph type="title"/>
+          <p:cNvPr id="2" name="Title 1">
+            <a:extLst>
+              <a:ext uri="{FF2B5EF4-FFF2-40B4-BE49-F238E27FC236}">
+                <a16:creationId xmlns:a16="http://schemas.microsoft.com/office/drawing/2014/main" id="{C5F2FB0B-15EC-453B-BC9B-69AD35DDCEA3}"/>
+              </a:ext>
+            </a:extLst>
+          </p:cNvPr>
+          <p:cNvSpPr>
+            <a:spLocks noGrp="1"/>
+          </p:cNvSpPr>
+          <p:nvPr>
+            <p:ph type="ctrTitle"/>
+          </p:nvPr>
+        </p:nvSpPr>
+        <p:spPr/>
+        <p:txBody>
+          <a:bodyPr/>
+          <a:lstStyle/>
+          <a:p>
+            <a:r>
+              <a:rPr lang="en-US" b="1" cap="all" spc="400" dirty="0">
+                <a:solidFill>
+                  <a:schemeClr val="bg1"/>
+                </a:solidFill>
+                <a:latin typeface="+mn-lt"/>
+              </a:rPr>
+              <a:t>Testing</a:t>
+            </a:r>
+            <a:br>
+              <a:rPr lang="en-US" b="1" cap="all" spc="400" dirty="0">
+                <a:solidFill>
+                  <a:schemeClr val="bg1"/>
+                </a:solidFill>
+                <a:latin typeface="+mn-lt"/>
+              </a:rPr>
+            </a:br>
+            <a:r>
+              <a:rPr lang="en-US" b="1" cap="all" spc="400" dirty="0">
+                <a:solidFill>
+                  <a:schemeClr val="bg1"/>
+                </a:solidFill>
+                <a:latin typeface="+mn-lt"/>
+              </a:rPr>
+              <a:t>DEMO</a:t>
+            </a:r>
+            <a:endParaRPr lang="en-US" dirty="0"/>
+          </a:p>
+        </p:txBody>
+      </p:sp>
+      <p:sp>
+        <p:nvSpPr>
+          <p:cNvPr id="3" name="Subtitle 2">
+            <a:extLst>
+              <a:ext uri="{FF2B5EF4-FFF2-40B4-BE49-F238E27FC236}">
+                <a16:creationId xmlns:a16="http://schemas.microsoft.com/office/drawing/2014/main" id="{05408798-0DB3-46BF-880E-7BB904D700F6}"/>
+              </a:ext>
+            </a:extLst>
+          </p:cNvPr>
+          <p:cNvSpPr>
+            <a:spLocks noGrp="1"/>
+          </p:cNvSpPr>
+          <p:nvPr>
+            <p:ph type="subTitle" idx="1"/>
           </p:nvPr>
         </p:nvSpPr>
         <p:spPr/>
@@ -11331,193 +11383,16 @@
           <a:lstStyle/>
           <a:p>
             <a:r>
-              <a:rPr lang="en-US" sz="5400" dirty="0" err="1"/>
-              <a:t>PSScriptAnalyzer</a:t>
-            </a:r>
-            <a:endParaRPr lang="en-US" dirty="0"/>
-          </a:p>
-        </p:txBody>
-      </p:sp>
-      <p:sp>
-        <p:nvSpPr>
-          <p:cNvPr id="4" name="Content Placeholder 3">
-            <a:extLst>
-              <a:ext uri="{FF2B5EF4-FFF2-40B4-BE49-F238E27FC236}">
-                <a16:creationId xmlns:a16="http://schemas.microsoft.com/office/drawing/2014/main" id="{B0881FA9-F3B0-4912-B0E1-352094195C30}"/>
-              </a:ext>
-            </a:extLst>
-          </p:cNvPr>
-          <p:cNvSpPr>
-            <a:spLocks noGrp="1"/>
-          </p:cNvSpPr>
-          <p:nvPr>
-            <p:ph idx="1"/>
-          </p:nvPr>
-        </p:nvSpPr>
-        <p:spPr>
-          <a:xfrm>
-            <a:off x="850391" y="2825496"/>
-            <a:ext cx="10743511" cy="3346704"/>
-          </a:xfrm>
-        </p:spPr>
-        <p:txBody>
-          <a:bodyPr>
-            <a:normAutofit fontScale="92500" lnSpcReduction="20000"/>
-          </a:bodyPr>
-          <a:lstStyle/>
-          <a:p>
-            <a:r>
-              <a:rPr lang="en-US" dirty="0"/>
-              <a:t>Extension uses this PowerShell module for code analysis and formatting: </a:t>
-            </a:r>
-            <a:r>
-              <a:rPr lang="en-US" dirty="0">
-                <a:hlinkClick r:id="rId2"/>
-              </a:rPr>
-              <a:t>https://github.com/PowerShell/PSScriptAnalyzer</a:t>
-            </a:r>
-            <a:endParaRPr lang="en-US" dirty="0"/>
-          </a:p>
-          <a:p>
-            <a:endParaRPr lang="en-US" dirty="0"/>
-          </a:p>
-          <a:p>
-            <a:r>
-              <a:rPr lang="en-US" dirty="0"/>
-              <a:t>Docs now on learn.microsoft.com:</a:t>
-            </a:r>
-          </a:p>
-          <a:p>
-            <a:r>
-              <a:rPr lang="en-US" dirty="0" err="1">
-                <a:hlinkClick r:id="rId3"/>
-              </a:rPr>
-              <a:t>PSScriptAnalyzer</a:t>
-            </a:r>
-            <a:r>
-              <a:rPr lang="en-US" dirty="0">
-                <a:hlinkClick r:id="rId3"/>
-              </a:rPr>
-              <a:t> module - PowerShell | Microsoft Learn</a:t>
-            </a:r>
-            <a:endParaRPr lang="en-US" dirty="0"/>
-          </a:p>
-          <a:p>
-            <a:endParaRPr lang="en-US" dirty="0"/>
-          </a:p>
-          <a:p>
-            <a:r>
-              <a:rPr lang="en-US" dirty="0"/>
-              <a:t>Interaction happens indirectly via generic backend solution:  </a:t>
-            </a:r>
-            <a:r>
-              <a:rPr lang="en-US" dirty="0">
-                <a:hlinkClick r:id="rId4"/>
-              </a:rPr>
-              <a:t>https://github.com/PowerShell/PowerShellEditorServices</a:t>
-            </a:r>
-            <a:endParaRPr lang="en-US" dirty="0"/>
-          </a:p>
-          <a:p>
-            <a:r>
-              <a:rPr lang="en-US" dirty="0"/>
-              <a:t>Caveat: Extension/</a:t>
-            </a:r>
-            <a:r>
-              <a:rPr lang="en-US" dirty="0" err="1"/>
-              <a:t>PowerShellEditorServices</a:t>
-            </a:r>
-            <a:r>
-              <a:rPr lang="en-US" dirty="0"/>
-              <a:t> uses different defaults</a:t>
-            </a:r>
-          </a:p>
-        </p:txBody>
-      </p:sp>
-      <p:sp>
-        <p:nvSpPr>
-          <p:cNvPr id="9" name="Date Placeholder 8">
-            <a:extLst>
-              <a:ext uri="{FF2B5EF4-FFF2-40B4-BE49-F238E27FC236}">
-                <a16:creationId xmlns:a16="http://schemas.microsoft.com/office/drawing/2014/main" id="{D45C472E-4078-40A0-83A2-652E8356EDCB}"/>
-              </a:ext>
-            </a:extLst>
-          </p:cNvPr>
-          <p:cNvSpPr>
-            <a:spLocks noGrp="1"/>
-          </p:cNvSpPr>
-          <p:nvPr>
-            <p:ph type="dt" sz="half" idx="10"/>
-          </p:nvPr>
-        </p:nvSpPr>
-        <p:spPr/>
-        <p:txBody>
-          <a:bodyPr/>
-          <a:lstStyle/>
-          <a:p>
-            <a:endParaRPr lang="en-US" dirty="0"/>
-          </a:p>
-        </p:txBody>
-      </p:sp>
-      <p:sp>
-        <p:nvSpPr>
-          <p:cNvPr id="10" name="Footer Placeholder 9">
-            <a:extLst>
-              <a:ext uri="{FF2B5EF4-FFF2-40B4-BE49-F238E27FC236}">
-                <a16:creationId xmlns:a16="http://schemas.microsoft.com/office/drawing/2014/main" id="{A8C7C3A0-5E78-49C8-B8D4-F3DF62B2BC93}"/>
-              </a:ext>
-            </a:extLst>
-          </p:cNvPr>
-          <p:cNvSpPr>
-            <a:spLocks noGrp="1"/>
-          </p:cNvSpPr>
-          <p:nvPr>
-            <p:ph type="ftr" sz="quarter" idx="11"/>
-          </p:nvPr>
-        </p:nvSpPr>
-        <p:spPr/>
-        <p:txBody>
-          <a:bodyPr/>
-          <a:lstStyle/>
-          <a:p>
-            <a:endParaRPr lang="en-US" dirty="0"/>
-          </a:p>
-        </p:txBody>
-      </p:sp>
-      <p:sp>
-        <p:nvSpPr>
-          <p:cNvPr id="11" name="Slide Number Placeholder 10">
-            <a:extLst>
-              <a:ext uri="{FF2B5EF4-FFF2-40B4-BE49-F238E27FC236}">
-                <a16:creationId xmlns:a16="http://schemas.microsoft.com/office/drawing/2014/main" id="{56AE2454-CE9A-4A6B-AB5A-349E0D967654}"/>
-              </a:ext>
-            </a:extLst>
-          </p:cNvPr>
-          <p:cNvSpPr>
-            <a:spLocks noGrp="1"/>
-          </p:cNvSpPr>
-          <p:nvPr>
-            <p:ph type="sldNum" sz="quarter" idx="12"/>
-          </p:nvPr>
-        </p:nvSpPr>
-        <p:spPr/>
-        <p:txBody>
-          <a:bodyPr/>
-          <a:lstStyle/>
-          <a:p>
-            <a:fld id="{D8DA9DAA-006C-4F4B-980E-E3DF019B24E2}" type="slidenum">
-              <a:rPr lang="en-US" smtClean="0"/>
-              <a:pPr/>
-              <a:t>10</a:t>
-            </a:fld>
-            <a:endParaRPr lang="en-US" dirty="0"/>
+              <a:rPr lang="en-US" sz="2800" dirty="0"/>
+              <a:t>Running Pester</a:t>
+            </a:r>
           </a:p>
         </p:txBody>
       </p:sp>
     </p:spTree>
     <p:extLst>
       <p:ext uri="{BB962C8B-B14F-4D97-AF65-F5344CB8AC3E}">
-        <p14:creationId xmlns:p14="http://schemas.microsoft.com/office/powerpoint/2010/main" val="4284566111"/>
+        <p14:creationId xmlns:p14="http://schemas.microsoft.com/office/powerpoint/2010/main" val="3260804842"/>
       </p:ext>
     </p:extLst>
   </p:cSld>
@@ -11546,69 +11421,18 @@
       </p:grpSpPr>
       <p:sp>
         <p:nvSpPr>
-          <p:cNvPr id="2" name="Title 1">
-            <a:extLst>
-              <a:ext uri="{FF2B5EF4-FFF2-40B4-BE49-F238E27FC236}">
-                <a16:creationId xmlns:a16="http://schemas.microsoft.com/office/drawing/2014/main" id="{C5F2FB0B-15EC-453B-BC9B-69AD35DDCEA3}"/>
-              </a:ext>
-            </a:extLst>
-          </p:cNvPr>
-          <p:cNvSpPr>
-            <a:spLocks noGrp="1"/>
-          </p:cNvSpPr>
-          <p:nvPr>
-            <p:ph type="ctrTitle"/>
-          </p:nvPr>
-        </p:nvSpPr>
-        <p:spPr/>
-        <p:txBody>
-          <a:bodyPr/>
-          <a:lstStyle/>
-          <a:p>
-            <a:r>
-              <a:rPr lang="en-US" b="1" cap="all" spc="400" dirty="0">
-                <a:solidFill>
-                  <a:schemeClr val="bg1"/>
-                </a:solidFill>
-                <a:latin typeface="+mn-lt"/>
-              </a:rPr>
-              <a:t>Splatting</a:t>
-            </a:r>
-            <a:br>
-              <a:rPr lang="en-US" b="1" cap="all" spc="400" dirty="0">
-                <a:solidFill>
-                  <a:schemeClr val="bg1"/>
-                </a:solidFill>
-                <a:latin typeface="+mn-lt"/>
-              </a:rPr>
-            </a:br>
-            <a:r>
-              <a:rPr lang="en-US" b="1" cap="all" spc="400" dirty="0">
-                <a:solidFill>
-                  <a:schemeClr val="bg1"/>
-                </a:solidFill>
-                <a:latin typeface="+mn-lt"/>
-              </a:rPr>
-              <a:t>DEMO</a:t>
-            </a:r>
-            <a:endParaRPr lang="en-US" dirty="0"/>
-          </a:p>
-        </p:txBody>
-      </p:sp>
-      <p:sp>
-        <p:nvSpPr>
-          <p:cNvPr id="3" name="Subtitle 2">
-            <a:extLst>
-              <a:ext uri="{FF2B5EF4-FFF2-40B4-BE49-F238E27FC236}">
-                <a16:creationId xmlns:a16="http://schemas.microsoft.com/office/drawing/2014/main" id="{05408798-0DB3-46BF-880E-7BB904D700F6}"/>
-              </a:ext>
-            </a:extLst>
-          </p:cNvPr>
-          <p:cNvSpPr>
-            <a:spLocks noGrp="1"/>
-          </p:cNvSpPr>
-          <p:nvPr>
-            <p:ph type="subTitle" idx="1"/>
+          <p:cNvPr id="3" name="Title 2">
+            <a:extLst>
+              <a:ext uri="{FF2B5EF4-FFF2-40B4-BE49-F238E27FC236}">
+                <a16:creationId xmlns:a16="http://schemas.microsoft.com/office/drawing/2014/main" id="{0115FF41-AFA4-4D25-AB42-AB034F4B4FEC}"/>
+              </a:ext>
+            </a:extLst>
+          </p:cNvPr>
+          <p:cNvSpPr>
+            <a:spLocks noGrp="1"/>
+          </p:cNvSpPr>
+          <p:nvPr>
+            <p:ph type="title"/>
           </p:nvPr>
         </p:nvSpPr>
         <p:spPr/>
@@ -11619,21 +11443,193 @@
           <a:lstStyle/>
           <a:p>
             <a:r>
-              <a:rPr lang="en-US" sz="2800" dirty="0"/>
-              <a:t>Tab Completion in the editor </a:t>
-            </a:r>
-            <a:r>
-              <a:rPr lang="en-GB" sz="2800" dirty="0"/>
-              <a:t>🤯</a:t>
-            </a:r>
-            <a:endParaRPr lang="en-US" sz="2800" dirty="0"/>
+              <a:rPr lang="en-US" sz="5400" dirty="0" err="1"/>
+              <a:t>PSScriptAnalyzer</a:t>
+            </a:r>
+            <a:endParaRPr lang="en-US" dirty="0"/>
+          </a:p>
+        </p:txBody>
+      </p:sp>
+      <p:sp>
+        <p:nvSpPr>
+          <p:cNvPr id="4" name="Content Placeholder 3">
+            <a:extLst>
+              <a:ext uri="{FF2B5EF4-FFF2-40B4-BE49-F238E27FC236}">
+                <a16:creationId xmlns:a16="http://schemas.microsoft.com/office/drawing/2014/main" id="{B0881FA9-F3B0-4912-B0E1-352094195C30}"/>
+              </a:ext>
+            </a:extLst>
+          </p:cNvPr>
+          <p:cNvSpPr>
+            <a:spLocks noGrp="1"/>
+          </p:cNvSpPr>
+          <p:nvPr>
+            <p:ph idx="1"/>
+          </p:nvPr>
+        </p:nvSpPr>
+        <p:spPr>
+          <a:xfrm>
+            <a:off x="850391" y="2825496"/>
+            <a:ext cx="10743511" cy="3346704"/>
+          </a:xfrm>
+        </p:spPr>
+        <p:txBody>
+          <a:bodyPr>
+            <a:normAutofit fontScale="92500" lnSpcReduction="20000"/>
+          </a:bodyPr>
+          <a:lstStyle/>
+          <a:p>
+            <a:r>
+              <a:rPr lang="en-US" dirty="0"/>
+              <a:t>Extension uses this PowerShell module for code analysis and formatting: </a:t>
+            </a:r>
+            <a:r>
+              <a:rPr lang="en-US" dirty="0">
+                <a:hlinkClick r:id="rId2"/>
+              </a:rPr>
+              <a:t>https://github.com/PowerShell/PSScriptAnalyzer</a:t>
+            </a:r>
+            <a:endParaRPr lang="en-US" dirty="0"/>
+          </a:p>
+          <a:p>
+            <a:endParaRPr lang="en-US" dirty="0"/>
+          </a:p>
+          <a:p>
+            <a:r>
+              <a:rPr lang="en-US" dirty="0"/>
+              <a:t>Docs now on learn.microsoft.com:</a:t>
+            </a:r>
+          </a:p>
+          <a:p>
+            <a:r>
+              <a:rPr lang="en-US" dirty="0" err="1">
+                <a:hlinkClick r:id="rId3"/>
+              </a:rPr>
+              <a:t>PSScriptAnalyzer</a:t>
+            </a:r>
+            <a:r>
+              <a:rPr lang="en-US" dirty="0">
+                <a:hlinkClick r:id="rId3"/>
+              </a:rPr>
+              <a:t> module - PowerShell | Microsoft Learn</a:t>
+            </a:r>
+            <a:endParaRPr lang="en-US" dirty="0"/>
+          </a:p>
+          <a:p>
+            <a:endParaRPr lang="en-US" dirty="0"/>
+          </a:p>
+          <a:p>
+            <a:r>
+              <a:rPr lang="en-US" dirty="0"/>
+              <a:t>Interaction happens indirectly via generic backend solution:  </a:t>
+            </a:r>
+            <a:r>
+              <a:rPr lang="en-US" dirty="0">
+                <a:hlinkClick r:id="rId4"/>
+              </a:rPr>
+              <a:t>https://github.com/PowerShell/PowerShellEditorServices</a:t>
+            </a:r>
+            <a:endParaRPr lang="en-US" dirty="0"/>
+          </a:p>
+          <a:p>
+            <a:r>
+              <a:rPr lang="en-US" dirty="0"/>
+              <a:t>Caveat: Extension/</a:t>
+            </a:r>
+            <a:r>
+              <a:rPr lang="en-US" dirty="0" err="1"/>
+              <a:t>PowerShellEditorServices</a:t>
+            </a:r>
+            <a:r>
+              <a:rPr lang="en-US" dirty="0"/>
+              <a:t> uses different defaults</a:t>
+            </a:r>
+          </a:p>
+        </p:txBody>
+      </p:sp>
+      <p:sp>
+        <p:nvSpPr>
+          <p:cNvPr id="9" name="Date Placeholder 8">
+            <a:extLst>
+              <a:ext uri="{FF2B5EF4-FFF2-40B4-BE49-F238E27FC236}">
+                <a16:creationId xmlns:a16="http://schemas.microsoft.com/office/drawing/2014/main" id="{D45C472E-4078-40A0-83A2-652E8356EDCB}"/>
+              </a:ext>
+            </a:extLst>
+          </p:cNvPr>
+          <p:cNvSpPr>
+            <a:spLocks noGrp="1"/>
+          </p:cNvSpPr>
+          <p:nvPr>
+            <p:ph type="dt" sz="half" idx="10"/>
+          </p:nvPr>
+        </p:nvSpPr>
+        <p:spPr/>
+        <p:txBody>
+          <a:bodyPr/>
+          <a:lstStyle/>
+          <a:p>
+            <a:endParaRPr lang="en-US" dirty="0"/>
+          </a:p>
+        </p:txBody>
+      </p:sp>
+      <p:sp>
+        <p:nvSpPr>
+          <p:cNvPr id="10" name="Footer Placeholder 9">
+            <a:extLst>
+              <a:ext uri="{FF2B5EF4-FFF2-40B4-BE49-F238E27FC236}">
+                <a16:creationId xmlns:a16="http://schemas.microsoft.com/office/drawing/2014/main" id="{A8C7C3A0-5E78-49C8-B8D4-F3DF62B2BC93}"/>
+              </a:ext>
+            </a:extLst>
+          </p:cNvPr>
+          <p:cNvSpPr>
+            <a:spLocks noGrp="1"/>
+          </p:cNvSpPr>
+          <p:nvPr>
+            <p:ph type="ftr" sz="quarter" idx="11"/>
+          </p:nvPr>
+        </p:nvSpPr>
+        <p:spPr/>
+        <p:txBody>
+          <a:bodyPr/>
+          <a:lstStyle/>
+          <a:p>
+            <a:endParaRPr lang="en-US" dirty="0"/>
+          </a:p>
+        </p:txBody>
+      </p:sp>
+      <p:sp>
+        <p:nvSpPr>
+          <p:cNvPr id="11" name="Slide Number Placeholder 10">
+            <a:extLst>
+              <a:ext uri="{FF2B5EF4-FFF2-40B4-BE49-F238E27FC236}">
+                <a16:creationId xmlns:a16="http://schemas.microsoft.com/office/drawing/2014/main" id="{56AE2454-CE9A-4A6B-AB5A-349E0D967654}"/>
+              </a:ext>
+            </a:extLst>
+          </p:cNvPr>
+          <p:cNvSpPr>
+            <a:spLocks noGrp="1"/>
+          </p:cNvSpPr>
+          <p:nvPr>
+            <p:ph type="sldNum" sz="quarter" idx="12"/>
+          </p:nvPr>
+        </p:nvSpPr>
+        <p:spPr/>
+        <p:txBody>
+          <a:bodyPr/>
+          <a:lstStyle/>
+          <a:p>
+            <a:fld id="{D8DA9DAA-006C-4F4B-980E-E3DF019B24E2}" type="slidenum">
+              <a:rPr lang="en-US" smtClean="0"/>
+              <a:pPr/>
+              <a:t>11</a:t>
+            </a:fld>
+            <a:endParaRPr lang="en-US" dirty="0"/>
           </a:p>
         </p:txBody>
       </p:sp>
     </p:spTree>
     <p:extLst>
       <p:ext uri="{BB962C8B-B14F-4D97-AF65-F5344CB8AC3E}">
-        <p14:creationId xmlns:p14="http://schemas.microsoft.com/office/powerpoint/2010/main" val="3316013963"/>
+        <p14:creationId xmlns:p14="http://schemas.microsoft.com/office/powerpoint/2010/main" val="4284566111"/>
       </p:ext>
     </p:extLst>
   </p:cSld>
@@ -11688,7 +11684,24 @@
                 </a:solidFill>
                 <a:latin typeface="+mn-lt"/>
               </a:rPr>
-              <a:t>Formatting</a:t>
+              <a:t>Splatting</a:t>
+            </a:r>
+            <a:br>
+              <a:rPr lang="en-US" b="1" cap="all" spc="400" dirty="0">
+                <a:solidFill>
+                  <a:schemeClr val="bg1"/>
+                </a:solidFill>
+                <a:latin typeface="+mn-lt"/>
+              </a:rPr>
+            </a:br>
+            <a:r>
+              <a:rPr lang="en-US" b="1" cap="all" spc="400" dirty="0">
+                <a:solidFill>
+                  <a:schemeClr val="bg1"/>
+                </a:solidFill>
+                <a:latin typeface="+mn-lt"/>
+              </a:rPr>
+              <a:t>DEMO</a:t>
             </a:r>
             <a:endParaRPr lang="en-US" dirty="0"/>
           </a:p>
@@ -11712,17 +11725,27 @@
         </p:nvSpPr>
         <p:spPr/>
         <p:txBody>
-          <a:bodyPr/>
+          <a:bodyPr>
+            <a:normAutofit/>
+          </a:bodyPr>
           <a:lstStyle/>
           <a:p>
-            <a:endParaRPr lang="en-US" dirty="0"/>
+            <a:r>
+              <a:rPr lang="en-US" sz="2800" dirty="0"/>
+              <a:t>Tab Completion in the editor </a:t>
+            </a:r>
+            <a:r>
+              <a:rPr lang="en-GB" sz="2800" dirty="0"/>
+              <a:t>🤯</a:t>
+            </a:r>
+            <a:endParaRPr lang="en-US" sz="2800" dirty="0"/>
           </a:p>
         </p:txBody>
       </p:sp>
     </p:spTree>
     <p:extLst>
       <p:ext uri="{BB962C8B-B14F-4D97-AF65-F5344CB8AC3E}">
-        <p14:creationId xmlns:p14="http://schemas.microsoft.com/office/powerpoint/2010/main" val="363548815"/>
+        <p14:creationId xmlns:p14="http://schemas.microsoft.com/office/powerpoint/2010/main" val="3316013963"/>
       </p:ext>
     </p:extLst>
   </p:cSld>
@@ -11751,132 +11774,18 @@
       </p:grpSpPr>
       <p:sp>
         <p:nvSpPr>
-          <p:cNvPr id="3" name="Title 2">
-            <a:extLst>
-              <a:ext uri="{FF2B5EF4-FFF2-40B4-BE49-F238E27FC236}">
-                <a16:creationId xmlns:a16="http://schemas.microsoft.com/office/drawing/2014/main" id="{0115FF41-AFA4-4D25-AB42-AB034F4B4FEC}"/>
-              </a:ext>
-            </a:extLst>
-          </p:cNvPr>
-          <p:cNvSpPr>
-            <a:spLocks noGrp="1"/>
-          </p:cNvSpPr>
-          <p:nvPr>
-            <p:ph type="title"/>
-          </p:nvPr>
-        </p:nvSpPr>
-        <p:spPr/>
-        <p:txBody>
-          <a:bodyPr>
-            <a:normAutofit/>
-          </a:bodyPr>
-          <a:lstStyle/>
-          <a:p>
-            <a:r>
-              <a:rPr lang="en-US" sz="5400" dirty="0"/>
-              <a:t>Formatting</a:t>
-            </a:r>
-            <a:endParaRPr lang="en-US" dirty="0"/>
-          </a:p>
-        </p:txBody>
-      </p:sp>
-      <p:sp>
-        <p:nvSpPr>
-          <p:cNvPr id="4" name="Content Placeholder 3">
-            <a:extLst>
-              <a:ext uri="{FF2B5EF4-FFF2-40B4-BE49-F238E27FC236}">
-                <a16:creationId xmlns:a16="http://schemas.microsoft.com/office/drawing/2014/main" id="{B0881FA9-F3B0-4912-B0E1-352094195C30}"/>
-              </a:ext>
-            </a:extLst>
-          </p:cNvPr>
-          <p:cNvSpPr>
-            <a:spLocks noGrp="1"/>
-          </p:cNvSpPr>
-          <p:nvPr>
-            <p:ph idx="1"/>
-          </p:nvPr>
-        </p:nvSpPr>
-        <p:spPr>
-          <a:xfrm>
-            <a:off x="850391" y="2825496"/>
-            <a:ext cx="9932628" cy="3346704"/>
-          </a:xfrm>
-        </p:spPr>
-        <p:txBody>
-          <a:bodyPr>
-            <a:normAutofit/>
-          </a:bodyPr>
-          <a:lstStyle/>
-          <a:p>
-            <a:r>
-              <a:rPr lang="en-US" sz="2800" dirty="0"/>
-              <a:t>Main style can be controlled via this setting: </a:t>
-            </a:r>
-            <a:r>
-              <a:rPr lang="en-US" sz="2800" b="1" dirty="0" err="1"/>
-              <a:t>powershell.codeFormatting.preset</a:t>
-            </a:r>
-            <a:endParaRPr lang="en-US" sz="2800" b="1" dirty="0"/>
-          </a:p>
-          <a:p>
-            <a:r>
-              <a:rPr lang="en-US" sz="2800" dirty="0"/>
-              <a:t>Examples of styles are here: </a:t>
-            </a:r>
-            <a:r>
-              <a:rPr lang="en-US" sz="2800" dirty="0">
-                <a:hlinkClick r:id="rId2"/>
-              </a:rPr>
-              <a:t>There is no One True Brace Style · Issue #81 · </a:t>
-            </a:r>
-            <a:r>
-              <a:rPr lang="en-US" sz="2800" dirty="0" err="1">
-                <a:hlinkClick r:id="rId2"/>
-              </a:rPr>
-              <a:t>PoshCode</a:t>
-            </a:r>
-            <a:r>
-              <a:rPr lang="en-US" sz="2800" dirty="0">
-                <a:hlinkClick r:id="rId2"/>
-              </a:rPr>
-              <a:t>/</a:t>
-            </a:r>
-            <a:r>
-              <a:rPr lang="en-US" sz="2800" dirty="0" err="1">
-                <a:hlinkClick r:id="rId2"/>
-              </a:rPr>
-              <a:t>PowerShellPracticeAndStyle</a:t>
-            </a:r>
-            <a:r>
-              <a:rPr lang="en-US" sz="2800" dirty="0">
-                <a:hlinkClick r:id="rId2"/>
-              </a:rPr>
-              <a:t> (github.com)</a:t>
-            </a:r>
-            <a:endParaRPr lang="en-US" sz="2800" dirty="0"/>
-          </a:p>
-          <a:p>
-            <a:endParaRPr lang="en-US" sz="2800" dirty="0"/>
-          </a:p>
-          <a:p>
-            <a:endParaRPr lang="en-US" sz="2800" dirty="0"/>
-          </a:p>
-        </p:txBody>
-      </p:sp>
-      <p:sp>
-        <p:nvSpPr>
-          <p:cNvPr id="9" name="Date Placeholder 8">
-            <a:extLst>
-              <a:ext uri="{FF2B5EF4-FFF2-40B4-BE49-F238E27FC236}">
-                <a16:creationId xmlns:a16="http://schemas.microsoft.com/office/drawing/2014/main" id="{D45C472E-4078-40A0-83A2-652E8356EDCB}"/>
-              </a:ext>
-            </a:extLst>
-          </p:cNvPr>
-          <p:cNvSpPr>
-            <a:spLocks noGrp="1"/>
-          </p:cNvSpPr>
-          <p:nvPr>
-            <p:ph type="dt" sz="half" idx="10"/>
+          <p:cNvPr id="2" name="Title 1">
+            <a:extLst>
+              <a:ext uri="{FF2B5EF4-FFF2-40B4-BE49-F238E27FC236}">
+                <a16:creationId xmlns:a16="http://schemas.microsoft.com/office/drawing/2014/main" id="{C5F2FB0B-15EC-453B-BC9B-69AD35DDCEA3}"/>
+              </a:ext>
+            </a:extLst>
+          </p:cNvPr>
+          <p:cNvSpPr>
+            <a:spLocks noGrp="1"/>
+          </p:cNvSpPr>
+          <p:nvPr>
+            <p:ph type="ctrTitle"/>
           </p:nvPr>
         </p:nvSpPr>
         <p:spPr/>
@@ -11884,24 +11793,33 @@
           <a:bodyPr/>
           <a:lstStyle/>
           <a:p>
+            <a:r>
+              <a:rPr lang="en-US" b="1" cap="all" spc="400" dirty="0">
+                <a:solidFill>
+                  <a:schemeClr val="bg1"/>
+                </a:solidFill>
+                <a:latin typeface="+mn-lt"/>
+              </a:rPr>
+              <a:t>Formatting</a:t>
+            </a:r>
             <a:endParaRPr lang="en-US" dirty="0"/>
           </a:p>
         </p:txBody>
       </p:sp>
       <p:sp>
         <p:nvSpPr>
-          <p:cNvPr id="10" name="Footer Placeholder 9">
-            <a:extLst>
-              <a:ext uri="{FF2B5EF4-FFF2-40B4-BE49-F238E27FC236}">
-                <a16:creationId xmlns:a16="http://schemas.microsoft.com/office/drawing/2014/main" id="{A8C7C3A0-5E78-49C8-B8D4-F3DF62B2BC93}"/>
-              </a:ext>
-            </a:extLst>
-          </p:cNvPr>
-          <p:cNvSpPr>
-            <a:spLocks noGrp="1"/>
-          </p:cNvSpPr>
-          <p:nvPr>
-            <p:ph type="ftr" sz="quarter" idx="11"/>
+          <p:cNvPr id="3" name="Subtitle 2">
+            <a:extLst>
+              <a:ext uri="{FF2B5EF4-FFF2-40B4-BE49-F238E27FC236}">
+                <a16:creationId xmlns:a16="http://schemas.microsoft.com/office/drawing/2014/main" id="{05408798-0DB3-46BF-880E-7BB904D700F6}"/>
+              </a:ext>
+            </a:extLst>
+          </p:cNvPr>
+          <p:cNvSpPr>
+            <a:spLocks noGrp="1"/>
+          </p:cNvSpPr>
+          <p:nvPr>
+            <p:ph type="subTitle" idx="1"/>
           </p:nvPr>
         </p:nvSpPr>
         <p:spPr/>
@@ -11909,36 +11827,6 @@
           <a:bodyPr/>
           <a:lstStyle/>
           <a:p>
-            <a:endParaRPr lang="en-US" dirty="0"/>
-          </a:p>
-        </p:txBody>
-      </p:sp>
-      <p:sp>
-        <p:nvSpPr>
-          <p:cNvPr id="11" name="Slide Number Placeholder 10">
-            <a:extLst>
-              <a:ext uri="{FF2B5EF4-FFF2-40B4-BE49-F238E27FC236}">
-                <a16:creationId xmlns:a16="http://schemas.microsoft.com/office/drawing/2014/main" id="{56AE2454-CE9A-4A6B-AB5A-349E0D967654}"/>
-              </a:ext>
-            </a:extLst>
-          </p:cNvPr>
-          <p:cNvSpPr>
-            <a:spLocks noGrp="1"/>
-          </p:cNvSpPr>
-          <p:nvPr>
-            <p:ph type="sldNum" sz="quarter" idx="12"/>
-          </p:nvPr>
-        </p:nvSpPr>
-        <p:spPr/>
-        <p:txBody>
-          <a:bodyPr/>
-          <a:lstStyle/>
-          <a:p>
-            <a:fld id="{D8DA9DAA-006C-4F4B-980E-E3DF019B24E2}" type="slidenum">
-              <a:rPr lang="en-US" smtClean="0"/>
-              <a:pPr/>
-              <a:t>13</a:t>
-            </a:fld>
             <a:endParaRPr lang="en-US" dirty="0"/>
           </a:p>
         </p:txBody>
@@ -11946,7 +11834,7 @@
     </p:spTree>
     <p:extLst>
       <p:ext uri="{BB962C8B-B14F-4D97-AF65-F5344CB8AC3E}">
-        <p14:creationId xmlns:p14="http://schemas.microsoft.com/office/powerpoint/2010/main" val="2872655624"/>
+        <p14:creationId xmlns:p14="http://schemas.microsoft.com/office/powerpoint/2010/main" val="363548815"/>
       </p:ext>
     </p:extLst>
   </p:cSld>
@@ -12028,72 +11916,62 @@
         </p:spPr>
         <p:txBody>
           <a:bodyPr>
-            <a:noAutofit/>
+            <a:normAutofit/>
           </a:bodyPr>
           <a:lstStyle/>
           <a:p>
             <a:r>
-              <a:rPr lang="en-US" sz="2200" dirty="0"/>
-              <a:t>Non default settings to make your life better:</a:t>
-            </a:r>
-          </a:p>
-          <a:p>
-            <a:endParaRPr lang="en-US" sz="2200" dirty="0"/>
-          </a:p>
-          <a:p>
-            <a:pPr marL="342900" indent="-342900">
-              <a:buFont typeface="Arial" panose="020B0604020202020204" pitchFamily="34" charset="0"/>
-              <a:buChar char="•"/>
-            </a:pPr>
-            <a:r>
-              <a:rPr lang="en-US" sz="2200" dirty="0" err="1"/>
-              <a:t>powershell.codeFormatting.autoCorrectAliases</a:t>
-            </a:r>
-            <a:endParaRPr lang="en-US" sz="2200" dirty="0"/>
-          </a:p>
-          <a:p>
-            <a:pPr marL="342900" indent="-342900">
-              <a:buFont typeface="Arial" panose="020B0604020202020204" pitchFamily="34" charset="0"/>
-              <a:buChar char="•"/>
-            </a:pPr>
-            <a:r>
-              <a:rPr lang="en-US" sz="2200" dirty="0" err="1"/>
-              <a:t>powershell.codeFormatting.useConstantStrings</a:t>
-            </a:r>
-            <a:endParaRPr lang="en-US" sz="2200" dirty="0"/>
-          </a:p>
-          <a:p>
-            <a:pPr marL="342900" indent="-342900">
-              <a:buFont typeface="Arial" panose="020B0604020202020204" pitchFamily="34" charset="0"/>
-              <a:buChar char="•"/>
-            </a:pPr>
-            <a:r>
-              <a:rPr lang="en-US" sz="2200" dirty="0" err="1"/>
-              <a:t>powershell.codeFormatting.useCorrectCasing</a:t>
-            </a:r>
-            <a:endParaRPr lang="en-US" sz="2200" dirty="0"/>
-          </a:p>
-          <a:p>
-            <a:pPr marL="342900" indent="-342900">
-              <a:buFont typeface="Arial" panose="020B0604020202020204" pitchFamily="34" charset="0"/>
-              <a:buChar char="•"/>
-            </a:pPr>
-            <a:r>
-              <a:rPr lang="en-US" sz="2200" dirty="0" err="1"/>
-              <a:t>powershell.codeFormatting.whitespaceBetweenParameters</a:t>
-            </a:r>
-            <a:endParaRPr lang="en-US" sz="2200" dirty="0"/>
-          </a:p>
-          <a:p>
-            <a:pPr marL="342900" indent="-342900">
-              <a:buFont typeface="Arial" panose="020B0604020202020204" pitchFamily="34" charset="0"/>
-              <a:buChar char="•"/>
-            </a:pPr>
-            <a:r>
-              <a:rPr lang="en-US" sz="2200" dirty="0" err="1"/>
-              <a:t>powershell.codeFormatting.pipelineIndentationStyle</a:t>
-            </a:r>
-            <a:endParaRPr lang="en-US" sz="2200" dirty="0"/>
+              <a:rPr lang="en-US" sz="2800" dirty="0"/>
+              <a:t>Main style can be controlled via this setting: </a:t>
+            </a:r>
+            <a:r>
+              <a:rPr lang="en-US" sz="2800" b="1" dirty="0" err="1"/>
+              <a:t>powershell.codeFormatting.preset</a:t>
+            </a:r>
+            <a:endParaRPr lang="en-US" sz="2800" b="1" dirty="0"/>
+          </a:p>
+          <a:p>
+            <a:r>
+              <a:rPr lang="en-US" sz="2800" dirty="0"/>
+              <a:t>Examples of styles are here: </a:t>
+            </a:r>
+            <a:r>
+              <a:rPr lang="en-US" sz="2800" dirty="0">
+                <a:hlinkClick r:id="rId2"/>
+              </a:rPr>
+              <a:t>There is no One True Brace Style · Issue #81 · </a:t>
+            </a:r>
+            <a:r>
+              <a:rPr lang="en-US" sz="2800" dirty="0" err="1">
+                <a:hlinkClick r:id="rId2"/>
+              </a:rPr>
+              <a:t>PoshCode</a:t>
+            </a:r>
+            <a:r>
+              <a:rPr lang="en-US" sz="2800" dirty="0">
+                <a:hlinkClick r:id="rId2"/>
+              </a:rPr>
+              <a:t>/</a:t>
+            </a:r>
+            <a:r>
+              <a:rPr lang="en-US" sz="2800" dirty="0" err="1">
+                <a:hlinkClick r:id="rId2"/>
+              </a:rPr>
+              <a:t>PowerShellPracticeAndStyle</a:t>
+            </a:r>
+            <a:r>
+              <a:rPr lang="en-US" sz="2800" dirty="0">
+                <a:hlinkClick r:id="rId2"/>
+              </a:rPr>
+              <a:t> (github.com)</a:t>
+            </a:r>
+            <a:endParaRPr lang="en-US" sz="2800" dirty="0"/>
+          </a:p>
+          <a:p>
+            <a:endParaRPr lang="en-US" sz="2800" dirty="0"/>
+          </a:p>
+          <a:p>
+            <a:endParaRPr lang="en-US" sz="2800" dirty="0"/>
           </a:p>
         </p:txBody>
       </p:sp>
@@ -12180,7 +12058,7 @@
     </p:spTree>
     <p:extLst>
       <p:ext uri="{BB962C8B-B14F-4D97-AF65-F5344CB8AC3E}">
-        <p14:creationId xmlns:p14="http://schemas.microsoft.com/office/powerpoint/2010/main" val="1886728926"/>
+        <p14:creationId xmlns:p14="http://schemas.microsoft.com/office/powerpoint/2010/main" val="2872655624"/>
       </p:ext>
     </p:extLst>
   </p:cSld>
@@ -12209,18 +12087,142 @@
       </p:grpSpPr>
       <p:sp>
         <p:nvSpPr>
-          <p:cNvPr id="2" name="Title 1">
-            <a:extLst>
-              <a:ext uri="{FF2B5EF4-FFF2-40B4-BE49-F238E27FC236}">
-                <a16:creationId xmlns:a16="http://schemas.microsoft.com/office/drawing/2014/main" id="{C5F2FB0B-15EC-453B-BC9B-69AD35DDCEA3}"/>
-              </a:ext>
-            </a:extLst>
-          </p:cNvPr>
-          <p:cNvSpPr>
-            <a:spLocks noGrp="1"/>
-          </p:cNvSpPr>
-          <p:nvPr>
-            <p:ph type="ctrTitle"/>
+          <p:cNvPr id="3" name="Title 2">
+            <a:extLst>
+              <a:ext uri="{FF2B5EF4-FFF2-40B4-BE49-F238E27FC236}">
+                <a16:creationId xmlns:a16="http://schemas.microsoft.com/office/drawing/2014/main" id="{0115FF41-AFA4-4D25-AB42-AB034F4B4FEC}"/>
+              </a:ext>
+            </a:extLst>
+          </p:cNvPr>
+          <p:cNvSpPr>
+            <a:spLocks noGrp="1"/>
+          </p:cNvSpPr>
+          <p:nvPr>
+            <p:ph type="title"/>
+          </p:nvPr>
+        </p:nvSpPr>
+        <p:spPr/>
+        <p:txBody>
+          <a:bodyPr>
+            <a:normAutofit/>
+          </a:bodyPr>
+          <a:lstStyle/>
+          <a:p>
+            <a:r>
+              <a:rPr lang="en-US" sz="5400" dirty="0"/>
+              <a:t>Formatting</a:t>
+            </a:r>
+            <a:endParaRPr lang="en-US" dirty="0"/>
+          </a:p>
+        </p:txBody>
+      </p:sp>
+      <p:sp>
+        <p:nvSpPr>
+          <p:cNvPr id="4" name="Content Placeholder 3">
+            <a:extLst>
+              <a:ext uri="{FF2B5EF4-FFF2-40B4-BE49-F238E27FC236}">
+                <a16:creationId xmlns:a16="http://schemas.microsoft.com/office/drawing/2014/main" id="{B0881FA9-F3B0-4912-B0E1-352094195C30}"/>
+              </a:ext>
+            </a:extLst>
+          </p:cNvPr>
+          <p:cNvSpPr>
+            <a:spLocks noGrp="1"/>
+          </p:cNvSpPr>
+          <p:nvPr>
+            <p:ph idx="1"/>
+          </p:nvPr>
+        </p:nvSpPr>
+        <p:spPr>
+          <a:xfrm>
+            <a:off x="850391" y="2825496"/>
+            <a:ext cx="9932628" cy="3346704"/>
+          </a:xfrm>
+        </p:spPr>
+        <p:txBody>
+          <a:bodyPr>
+            <a:noAutofit/>
+          </a:bodyPr>
+          <a:lstStyle/>
+          <a:p>
+            <a:r>
+              <a:rPr lang="en-US" sz="2200" dirty="0"/>
+              <a:t>Non default settings to make your life better:</a:t>
+            </a:r>
+          </a:p>
+          <a:p>
+            <a:endParaRPr lang="en-US" sz="2200" dirty="0"/>
+          </a:p>
+          <a:p>
+            <a:pPr marL="342900" indent="-342900">
+              <a:buFont typeface="Arial" panose="020B0604020202020204" pitchFamily="34" charset="0"/>
+              <a:buChar char="•"/>
+            </a:pPr>
+            <a:r>
+              <a:rPr lang="en-US" sz="2200" dirty="0" err="1"/>
+              <a:t>powershell.codeFormatting.autoCorrectAliases</a:t>
+            </a:r>
+            <a:endParaRPr lang="en-US" sz="2200" dirty="0"/>
+          </a:p>
+          <a:p>
+            <a:pPr marL="342900" indent="-342900">
+              <a:buFont typeface="Arial" panose="020B0604020202020204" pitchFamily="34" charset="0"/>
+              <a:buChar char="•"/>
+            </a:pPr>
+            <a:r>
+              <a:rPr lang="en-US" sz="2200" dirty="0" err="1"/>
+              <a:t>powershell.codeFormatting.useConstantStrings</a:t>
+            </a:r>
+            <a:endParaRPr lang="en-US" sz="2200" dirty="0"/>
+          </a:p>
+          <a:p>
+            <a:pPr marL="342900" indent="-342900">
+              <a:buFont typeface="Arial" panose="020B0604020202020204" pitchFamily="34" charset="0"/>
+              <a:buChar char="•"/>
+            </a:pPr>
+            <a:r>
+              <a:rPr lang="en-US" sz="2200" dirty="0" err="1"/>
+              <a:t>powershell.codeFormatting.useCorrectCasing</a:t>
+            </a:r>
+            <a:endParaRPr lang="en-US" sz="2200" dirty="0"/>
+          </a:p>
+          <a:p>
+            <a:pPr marL="342900" indent="-342900">
+              <a:buFont typeface="Arial" panose="020B0604020202020204" pitchFamily="34" charset="0"/>
+              <a:buChar char="•"/>
+            </a:pPr>
+            <a:r>
+              <a:rPr lang="en-US" sz="2200" dirty="0" err="1"/>
+              <a:t>powershell.codeFormatting.whitespaceBetweenParameters</a:t>
+            </a:r>
+            <a:endParaRPr lang="en-US" sz="2200" dirty="0"/>
+          </a:p>
+          <a:p>
+            <a:pPr marL="342900" indent="-342900">
+              <a:buFont typeface="Arial" panose="020B0604020202020204" pitchFamily="34" charset="0"/>
+              <a:buChar char="•"/>
+            </a:pPr>
+            <a:r>
+              <a:rPr lang="en-US" sz="2200" dirty="0" err="1"/>
+              <a:t>powershell.codeFormatting.pipelineIndentationStyle</a:t>
+            </a:r>
+            <a:endParaRPr lang="en-US" sz="2200" dirty="0"/>
+          </a:p>
+        </p:txBody>
+      </p:sp>
+      <p:sp>
+        <p:nvSpPr>
+          <p:cNvPr id="9" name="Date Placeholder 8">
+            <a:extLst>
+              <a:ext uri="{FF2B5EF4-FFF2-40B4-BE49-F238E27FC236}">
+                <a16:creationId xmlns:a16="http://schemas.microsoft.com/office/drawing/2014/main" id="{D45C472E-4078-40A0-83A2-652E8356EDCB}"/>
+              </a:ext>
+            </a:extLst>
+          </p:cNvPr>
+          <p:cNvSpPr>
+            <a:spLocks noGrp="1"/>
+          </p:cNvSpPr>
+          <p:nvPr>
+            <p:ph type="dt" sz="half" idx="10"/>
           </p:nvPr>
         </p:nvSpPr>
         <p:spPr/>
@@ -12228,33 +12230,24 @@
           <a:bodyPr/>
           <a:lstStyle/>
           <a:p>
-            <a:r>
-              <a:rPr lang="en-US" b="1" cap="all" spc="400" dirty="0">
-                <a:solidFill>
-                  <a:schemeClr val="bg1"/>
-                </a:solidFill>
-                <a:latin typeface="+mn-lt"/>
-              </a:rPr>
-              <a:t>Code Analysis</a:t>
-            </a:r>
             <a:endParaRPr lang="en-US" dirty="0"/>
           </a:p>
         </p:txBody>
       </p:sp>
       <p:sp>
         <p:nvSpPr>
-          <p:cNvPr id="3" name="Subtitle 2">
-            <a:extLst>
-              <a:ext uri="{FF2B5EF4-FFF2-40B4-BE49-F238E27FC236}">
-                <a16:creationId xmlns:a16="http://schemas.microsoft.com/office/drawing/2014/main" id="{05408798-0DB3-46BF-880E-7BB904D700F6}"/>
-              </a:ext>
-            </a:extLst>
-          </p:cNvPr>
-          <p:cNvSpPr>
-            <a:spLocks noGrp="1"/>
-          </p:cNvSpPr>
-          <p:nvPr>
-            <p:ph type="subTitle" idx="1"/>
+          <p:cNvPr id="10" name="Footer Placeholder 9">
+            <a:extLst>
+              <a:ext uri="{FF2B5EF4-FFF2-40B4-BE49-F238E27FC236}">
+                <a16:creationId xmlns:a16="http://schemas.microsoft.com/office/drawing/2014/main" id="{A8C7C3A0-5E78-49C8-B8D4-F3DF62B2BC93}"/>
+              </a:ext>
+            </a:extLst>
+          </p:cNvPr>
+          <p:cNvSpPr>
+            <a:spLocks noGrp="1"/>
+          </p:cNvSpPr>
+          <p:nvPr>
+            <p:ph type="ftr" sz="quarter" idx="11"/>
           </p:nvPr>
         </p:nvSpPr>
         <p:spPr/>
@@ -12262,6 +12255,36 @@
           <a:bodyPr/>
           <a:lstStyle/>
           <a:p>
+            <a:endParaRPr lang="en-US" dirty="0"/>
+          </a:p>
+        </p:txBody>
+      </p:sp>
+      <p:sp>
+        <p:nvSpPr>
+          <p:cNvPr id="11" name="Slide Number Placeholder 10">
+            <a:extLst>
+              <a:ext uri="{FF2B5EF4-FFF2-40B4-BE49-F238E27FC236}">
+                <a16:creationId xmlns:a16="http://schemas.microsoft.com/office/drawing/2014/main" id="{56AE2454-CE9A-4A6B-AB5A-349E0D967654}"/>
+              </a:ext>
+            </a:extLst>
+          </p:cNvPr>
+          <p:cNvSpPr>
+            <a:spLocks noGrp="1"/>
+          </p:cNvSpPr>
+          <p:nvPr>
+            <p:ph type="sldNum" sz="quarter" idx="12"/>
+          </p:nvPr>
+        </p:nvSpPr>
+        <p:spPr/>
+        <p:txBody>
+          <a:bodyPr/>
+          <a:lstStyle/>
+          <a:p>
+            <a:fld id="{D8DA9DAA-006C-4F4B-980E-E3DF019B24E2}" type="slidenum">
+              <a:rPr lang="en-US" smtClean="0"/>
+              <a:pPr/>
+              <a:t>15</a:t>
+            </a:fld>
             <a:endParaRPr lang="en-US" dirty="0"/>
           </a:p>
         </p:txBody>
@@ -12269,7 +12292,7 @@
     </p:spTree>
     <p:extLst>
       <p:ext uri="{BB962C8B-B14F-4D97-AF65-F5344CB8AC3E}">
-        <p14:creationId xmlns:p14="http://schemas.microsoft.com/office/powerpoint/2010/main" val="2227882511"/>
+        <p14:creationId xmlns:p14="http://schemas.microsoft.com/office/powerpoint/2010/main" val="1886728926"/>
       </p:ext>
     </p:extLst>
   </p:cSld>
@@ -12298,99 +12321,18 @@
       </p:grpSpPr>
       <p:sp>
         <p:nvSpPr>
-          <p:cNvPr id="3" name="Title 2">
-            <a:extLst>
-              <a:ext uri="{FF2B5EF4-FFF2-40B4-BE49-F238E27FC236}">
-                <a16:creationId xmlns:a16="http://schemas.microsoft.com/office/drawing/2014/main" id="{0115FF41-AFA4-4D25-AB42-AB034F4B4FEC}"/>
-              </a:ext>
-            </a:extLst>
-          </p:cNvPr>
-          <p:cNvSpPr>
-            <a:spLocks noGrp="1"/>
-          </p:cNvSpPr>
-          <p:nvPr>
-            <p:ph type="title"/>
-          </p:nvPr>
-        </p:nvSpPr>
-        <p:spPr/>
-        <p:txBody>
-          <a:bodyPr>
-            <a:normAutofit/>
-          </a:bodyPr>
-          <a:lstStyle/>
-          <a:p>
-            <a:r>
-              <a:rPr lang="en-US" sz="5400" dirty="0"/>
-              <a:t>Code Analysis</a:t>
-            </a:r>
-            <a:endParaRPr lang="en-US" dirty="0"/>
-          </a:p>
-        </p:txBody>
-      </p:sp>
-      <p:sp>
-        <p:nvSpPr>
-          <p:cNvPr id="4" name="Content Placeholder 3">
-            <a:extLst>
-              <a:ext uri="{FF2B5EF4-FFF2-40B4-BE49-F238E27FC236}">
-                <a16:creationId xmlns:a16="http://schemas.microsoft.com/office/drawing/2014/main" id="{B0881FA9-F3B0-4912-B0E1-352094195C30}"/>
-              </a:ext>
-            </a:extLst>
-          </p:cNvPr>
-          <p:cNvSpPr>
-            <a:spLocks noGrp="1"/>
-          </p:cNvSpPr>
-          <p:nvPr>
-            <p:ph idx="1"/>
-          </p:nvPr>
-        </p:nvSpPr>
-        <p:spPr>
-          <a:xfrm>
-            <a:off x="850391" y="2825496"/>
-            <a:ext cx="9932628" cy="3346704"/>
-          </a:xfrm>
-        </p:spPr>
-        <p:txBody>
-          <a:bodyPr>
-            <a:normAutofit/>
-          </a:bodyPr>
-          <a:lstStyle/>
-          <a:p>
-            <a:r>
-              <a:rPr lang="en-US" sz="2800" dirty="0"/>
-              <a:t>Not all rules are on by default!</a:t>
-            </a:r>
-          </a:p>
-          <a:p>
-            <a:r>
-              <a:rPr lang="en-US" sz="2800" dirty="0">
-                <a:hlinkClick r:id="rId2"/>
-              </a:rPr>
-              <a:t>https://github.com/PowerShell/PowerShellEditorServices/blob/ed655ae481c0d4a3b7ee7c6626b3c9e6d5010c5e/src/PowerShellEditorServices/Services/Analysis/AnalysisService.cs#LL63-L79C11</a:t>
-            </a:r>
-            <a:endParaRPr lang="en-US" sz="2800" dirty="0"/>
-          </a:p>
-          <a:p>
-            <a:endParaRPr lang="en-US" sz="2800" dirty="0"/>
-          </a:p>
-          <a:p>
-            <a:endParaRPr lang="en-US" sz="2800" dirty="0"/>
-          </a:p>
-        </p:txBody>
-      </p:sp>
-      <p:sp>
-        <p:nvSpPr>
-          <p:cNvPr id="9" name="Date Placeholder 8">
-            <a:extLst>
-              <a:ext uri="{FF2B5EF4-FFF2-40B4-BE49-F238E27FC236}">
-                <a16:creationId xmlns:a16="http://schemas.microsoft.com/office/drawing/2014/main" id="{D45C472E-4078-40A0-83A2-652E8356EDCB}"/>
-              </a:ext>
-            </a:extLst>
-          </p:cNvPr>
-          <p:cNvSpPr>
-            <a:spLocks noGrp="1"/>
-          </p:cNvSpPr>
-          <p:nvPr>
-            <p:ph type="dt" sz="half" idx="10"/>
+          <p:cNvPr id="2" name="Title 1">
+            <a:extLst>
+              <a:ext uri="{FF2B5EF4-FFF2-40B4-BE49-F238E27FC236}">
+                <a16:creationId xmlns:a16="http://schemas.microsoft.com/office/drawing/2014/main" id="{C5F2FB0B-15EC-453B-BC9B-69AD35DDCEA3}"/>
+              </a:ext>
+            </a:extLst>
+          </p:cNvPr>
+          <p:cNvSpPr>
+            <a:spLocks noGrp="1"/>
+          </p:cNvSpPr>
+          <p:nvPr>
+            <p:ph type="ctrTitle"/>
           </p:nvPr>
         </p:nvSpPr>
         <p:spPr/>
@@ -12398,24 +12340,33 @@
           <a:bodyPr/>
           <a:lstStyle/>
           <a:p>
+            <a:r>
+              <a:rPr lang="en-US" b="1" cap="all" spc="400" dirty="0">
+                <a:solidFill>
+                  <a:schemeClr val="bg1"/>
+                </a:solidFill>
+                <a:latin typeface="+mn-lt"/>
+              </a:rPr>
+              <a:t>Code Analysis</a:t>
+            </a:r>
             <a:endParaRPr lang="en-US" dirty="0"/>
           </a:p>
         </p:txBody>
       </p:sp>
       <p:sp>
         <p:nvSpPr>
-          <p:cNvPr id="10" name="Footer Placeholder 9">
-            <a:extLst>
-              <a:ext uri="{FF2B5EF4-FFF2-40B4-BE49-F238E27FC236}">
-                <a16:creationId xmlns:a16="http://schemas.microsoft.com/office/drawing/2014/main" id="{A8C7C3A0-5E78-49C8-B8D4-F3DF62B2BC93}"/>
-              </a:ext>
-            </a:extLst>
-          </p:cNvPr>
-          <p:cNvSpPr>
-            <a:spLocks noGrp="1"/>
-          </p:cNvSpPr>
-          <p:nvPr>
-            <p:ph type="ftr" sz="quarter" idx="11"/>
+          <p:cNvPr id="3" name="Subtitle 2">
+            <a:extLst>
+              <a:ext uri="{FF2B5EF4-FFF2-40B4-BE49-F238E27FC236}">
+                <a16:creationId xmlns:a16="http://schemas.microsoft.com/office/drawing/2014/main" id="{05408798-0DB3-46BF-880E-7BB904D700F6}"/>
+              </a:ext>
+            </a:extLst>
+          </p:cNvPr>
+          <p:cNvSpPr>
+            <a:spLocks noGrp="1"/>
+          </p:cNvSpPr>
+          <p:nvPr>
+            <p:ph type="subTitle" idx="1"/>
           </p:nvPr>
         </p:nvSpPr>
         <p:spPr/>
@@ -12423,36 +12374,6 @@
           <a:bodyPr/>
           <a:lstStyle/>
           <a:p>
-            <a:endParaRPr lang="en-US" dirty="0"/>
-          </a:p>
-        </p:txBody>
-      </p:sp>
-      <p:sp>
-        <p:nvSpPr>
-          <p:cNvPr id="11" name="Slide Number Placeholder 10">
-            <a:extLst>
-              <a:ext uri="{FF2B5EF4-FFF2-40B4-BE49-F238E27FC236}">
-                <a16:creationId xmlns:a16="http://schemas.microsoft.com/office/drawing/2014/main" id="{56AE2454-CE9A-4A6B-AB5A-349E0D967654}"/>
-              </a:ext>
-            </a:extLst>
-          </p:cNvPr>
-          <p:cNvSpPr>
-            <a:spLocks noGrp="1"/>
-          </p:cNvSpPr>
-          <p:nvPr>
-            <p:ph type="sldNum" sz="quarter" idx="12"/>
-          </p:nvPr>
-        </p:nvSpPr>
-        <p:spPr/>
-        <p:txBody>
-          <a:bodyPr/>
-          <a:lstStyle/>
-          <a:p>
-            <a:fld id="{D8DA9DAA-006C-4F4B-980E-E3DF019B24E2}" type="slidenum">
-              <a:rPr lang="en-US" smtClean="0"/>
-              <a:pPr/>
-              <a:t>16</a:t>
-            </a:fld>
             <a:endParaRPr lang="en-US" dirty="0"/>
           </a:p>
         </p:txBody>
@@ -12460,7 +12381,7 @@
     </p:spTree>
     <p:extLst>
       <p:ext uri="{BB962C8B-B14F-4D97-AF65-F5344CB8AC3E}">
-        <p14:creationId xmlns:p14="http://schemas.microsoft.com/office/powerpoint/2010/main" val="933498399"/>
+        <p14:creationId xmlns:p14="http://schemas.microsoft.com/office/powerpoint/2010/main" val="2227882511"/>
       </p:ext>
     </p:extLst>
   </p:cSld>
@@ -12541,54 +12462,30 @@
           </a:xfrm>
         </p:spPr>
         <p:txBody>
-          <a:bodyPr/>
+          <a:bodyPr>
+            <a:normAutofit/>
+          </a:bodyPr>
           <a:lstStyle/>
           <a:p>
             <a:r>
               <a:rPr lang="en-US" sz="2800" dirty="0"/>
-              <a:t>How to turn on (almost) all rules: Add a </a:t>
-            </a:r>
-            <a:r>
-              <a:rPr lang="en-US" sz="2800" dirty="0" err="1"/>
-              <a:t>PSScriptAnalyzer</a:t>
-            </a:r>
-            <a:r>
-              <a:rPr lang="en-US" sz="2800" dirty="0"/>
-              <a:t> settings file and add an empty hash table:  </a:t>
-            </a:r>
-            <a:r>
-              <a:rPr lang="en-US" sz="2800" b="1" dirty="0"/>
-              <a:t>@{}</a:t>
-            </a:r>
-          </a:p>
-          <a:p>
-            <a:r>
-              <a:rPr lang="en-GB" sz="2800" dirty="0"/>
-              <a:t>💡</a:t>
-            </a:r>
-            <a:r>
-              <a:rPr lang="en-US" sz="2800" dirty="0"/>
-              <a:t>Tip: If named </a:t>
-            </a:r>
-            <a:r>
-              <a:rPr lang="en-US" sz="2800" i="1" dirty="0"/>
-              <a:t>PSScriptAnalyzerSettings.psd1 </a:t>
-            </a:r>
-            <a:r>
-              <a:rPr lang="en-US" sz="2800" dirty="0"/>
-              <a:t>and placed in the root of the workspace, it gets picked up automatically, otherwise use this setting to define path to it: </a:t>
-            </a:r>
-            <a:r>
-              <a:rPr lang="en-US" sz="2800" dirty="0" err="1"/>
-              <a:t>powershell.scriptAnalysis.settingsPath</a:t>
+              <a:t>Not all rules are on by default!</a:t>
+            </a:r>
+          </a:p>
+          <a:p>
+            <a:r>
+              <a:rPr lang="en-US" sz="2800" dirty="0">
+                <a:hlinkClick r:id="rId2"/>
+              </a:rPr>
+              <a:t>https://github.com/PowerShell/PowerShellEditorServices/blob/ed655ae481c0d4a3b7ee7c6626b3c9e6d5010c5e/src/PowerShellEditorServices/Services/Analysis/AnalysisService.cs#LL63-L79C11</a:t>
             </a:r>
             <a:endParaRPr lang="en-US" sz="2800" dirty="0"/>
           </a:p>
           <a:p>
-            <a:endParaRPr lang="en-US" dirty="0"/>
-          </a:p>
-          <a:p>
-            <a:endParaRPr lang="en-US" dirty="0"/>
+            <a:endParaRPr lang="en-US" sz="2800" dirty="0"/>
+          </a:p>
+          <a:p>
+            <a:endParaRPr lang="en-US" sz="2800" dirty="0"/>
           </a:p>
         </p:txBody>
       </p:sp>
@@ -12675,7 +12572,7 @@
     </p:spTree>
     <p:extLst>
       <p:ext uri="{BB962C8B-B14F-4D97-AF65-F5344CB8AC3E}">
-        <p14:creationId xmlns:p14="http://schemas.microsoft.com/office/powerpoint/2010/main" val="862155348"/>
+        <p14:creationId xmlns:p14="http://schemas.microsoft.com/office/powerpoint/2010/main" val="933498399"/>
       </p:ext>
     </p:extLst>
   </p:cSld>
@@ -12760,49 +12657,46 @@
           <a:lstStyle/>
           <a:p>
             <a:r>
-              <a:rPr lang="en-US" dirty="0"/>
-              <a:t>Code Analysis Rules can be configured in more detail by adding to the settings file: </a:t>
-            </a:r>
-            <a:r>
-              <a:rPr lang="en-GB" dirty="0" err="1">
-                <a:hlinkClick r:id="rId2"/>
-              </a:rPr>
-              <a:t>AvoidUsingCmdletAliases</a:t>
-            </a:r>
-            <a:r>
-              <a:rPr lang="en-GB" dirty="0">
-                <a:hlinkClick r:id="rId2"/>
-              </a:rPr>
-              <a:t> - PowerShell | Microsoft Learn</a:t>
-            </a:r>
-            <a:endParaRPr lang="en-GB" dirty="0"/>
-          </a:p>
-          <a:p>
-            <a:r>
-              <a:rPr lang="en-GB"/>
-              <a:t>⚠️Compatibility </a:t>
-            </a:r>
-            <a:r>
-              <a:rPr lang="en-GB" dirty="0"/>
-              <a:t>rules cannot do anything </a:t>
-            </a:r>
-            <a:r>
-              <a:rPr lang="en-GB"/>
-              <a:t>without configuration</a:t>
-            </a:r>
-            <a:endParaRPr lang="en-GB" dirty="0"/>
-          </a:p>
-          <a:p>
-            <a:r>
-              <a:rPr lang="en-US" dirty="0"/>
-              <a:t>One can create custom rules as well: </a:t>
-            </a:r>
-            <a:r>
-              <a:rPr lang="en-US" dirty="0">
-                <a:hlinkClick r:id="rId3"/>
-              </a:rPr>
-              <a:t>Creating custom rules - PowerShell | Microsoft Learn</a:t>
-            </a:r>
+              <a:rPr lang="en-US" sz="2800" dirty="0"/>
+              <a:t>How to turn on (almost) all rules: Add a </a:t>
+            </a:r>
+            <a:r>
+              <a:rPr lang="en-US" sz="2800" dirty="0" err="1"/>
+              <a:t>PSScriptAnalyzer</a:t>
+            </a:r>
+            <a:r>
+              <a:rPr lang="en-US" sz="2800" dirty="0"/>
+              <a:t> settings file and add an empty hash table:  </a:t>
+            </a:r>
+            <a:r>
+              <a:rPr lang="en-US" sz="2800" b="1" dirty="0"/>
+              <a:t>@{}</a:t>
+            </a:r>
+          </a:p>
+          <a:p>
+            <a:r>
+              <a:rPr lang="en-GB" sz="2800" dirty="0"/>
+              <a:t>💡</a:t>
+            </a:r>
+            <a:r>
+              <a:rPr lang="en-US" sz="2800" dirty="0"/>
+              <a:t>Tip: If named </a:t>
+            </a:r>
+            <a:r>
+              <a:rPr lang="en-US" sz="2800" i="1" dirty="0"/>
+              <a:t>PSScriptAnalyzerSettings.psd1 </a:t>
+            </a:r>
+            <a:r>
+              <a:rPr lang="en-US" sz="2800" dirty="0"/>
+              <a:t>and placed in the root of the workspace, it gets picked up automatically, otherwise use this setting to define path to it: </a:t>
+            </a:r>
+            <a:r>
+              <a:rPr lang="en-US" sz="2800" dirty="0" err="1"/>
+              <a:t>powershell.scriptAnalysis.settingsPath</a:t>
+            </a:r>
+            <a:endParaRPr lang="en-US" sz="2800" dirty="0"/>
+          </a:p>
+          <a:p>
             <a:endParaRPr lang="en-US" dirty="0"/>
           </a:p>
           <a:p>
@@ -12893,7 +12787,7 @@
     </p:spTree>
     <p:extLst>
       <p:ext uri="{BB962C8B-B14F-4D97-AF65-F5344CB8AC3E}">
-        <p14:creationId xmlns:p14="http://schemas.microsoft.com/office/powerpoint/2010/main" val="256130368"/>
+        <p14:creationId xmlns:p14="http://schemas.microsoft.com/office/powerpoint/2010/main" val="862155348"/>
       </p:ext>
     </p:extLst>
   </p:cSld>
@@ -12922,35 +12816,168 @@
       </p:grpSpPr>
       <p:sp>
         <p:nvSpPr>
-          <p:cNvPr id="22" name="Date Placeholder 21">
-            <a:extLst>
-              <a:ext uri="{FF2B5EF4-FFF2-40B4-BE49-F238E27FC236}">
-                <a16:creationId xmlns:a16="http://schemas.microsoft.com/office/drawing/2014/main" id="{692474E6-3035-46B8-9C05-9B4204E8ED39}"/>
-              </a:ext>
-            </a:extLst>
-          </p:cNvPr>
-          <p:cNvSpPr>
-            <a:spLocks noGrp="1"/>
-          </p:cNvSpPr>
-          <p:nvPr>
-            <p:ph type="dt" sz="half" idx="10"/>
+          <p:cNvPr id="3" name="Title 2">
+            <a:extLst>
+              <a:ext uri="{FF2B5EF4-FFF2-40B4-BE49-F238E27FC236}">
+                <a16:creationId xmlns:a16="http://schemas.microsoft.com/office/drawing/2014/main" id="{0115FF41-AFA4-4D25-AB42-AB034F4B4FEC}"/>
+              </a:ext>
+            </a:extLst>
+          </p:cNvPr>
+          <p:cNvSpPr>
+            <a:spLocks noGrp="1"/>
+          </p:cNvSpPr>
+          <p:nvPr>
+            <p:ph type="title"/>
           </p:nvPr>
         </p:nvSpPr>
         <p:spPr/>
+        <p:txBody>
+          <a:bodyPr>
+            <a:normAutofit/>
+          </a:bodyPr>
+          <a:lstStyle/>
+          <a:p>
+            <a:r>
+              <a:rPr lang="en-US" sz="5400" dirty="0"/>
+              <a:t>Code Analysis</a:t>
+            </a:r>
+            <a:endParaRPr lang="en-US" dirty="0"/>
+          </a:p>
+        </p:txBody>
+      </p:sp>
+      <p:sp>
+        <p:nvSpPr>
+          <p:cNvPr id="4" name="Content Placeholder 3">
+            <a:extLst>
+              <a:ext uri="{FF2B5EF4-FFF2-40B4-BE49-F238E27FC236}">
+                <a16:creationId xmlns:a16="http://schemas.microsoft.com/office/drawing/2014/main" id="{B0881FA9-F3B0-4912-B0E1-352094195C30}"/>
+              </a:ext>
+            </a:extLst>
+          </p:cNvPr>
+          <p:cNvSpPr>
+            <a:spLocks noGrp="1"/>
+          </p:cNvSpPr>
+          <p:nvPr>
+            <p:ph idx="1"/>
+          </p:nvPr>
+        </p:nvSpPr>
+        <p:spPr>
+          <a:xfrm>
+            <a:off x="850391" y="2825496"/>
+            <a:ext cx="9932628" cy="3346704"/>
+          </a:xfrm>
+        </p:spPr>
         <p:txBody>
           <a:bodyPr/>
           <a:lstStyle/>
           <a:p>
+            <a:r>
+              <a:rPr lang="en-US" dirty="0"/>
+              <a:t>Code Analysis Rules can be configured in more detail by adding to the settings file: </a:t>
+            </a:r>
+            <a:r>
+              <a:rPr lang="en-GB" dirty="0" err="1">
+                <a:hlinkClick r:id="rId2"/>
+              </a:rPr>
+              <a:t>AvoidUsingCmdletAliases</a:t>
+            </a:r>
+            <a:r>
+              <a:rPr lang="en-GB" dirty="0">
+                <a:hlinkClick r:id="rId2"/>
+              </a:rPr>
+              <a:t> - PowerShell | Microsoft Learn</a:t>
+            </a:r>
+            <a:endParaRPr lang="en-GB" dirty="0"/>
+          </a:p>
+          <a:p>
+            <a:r>
+              <a:rPr lang="en-GB"/>
+              <a:t>⚠️Compatibility </a:t>
+            </a:r>
+            <a:r>
+              <a:rPr lang="en-GB" dirty="0"/>
+              <a:t>rules cannot do anything </a:t>
+            </a:r>
+            <a:r>
+              <a:rPr lang="en-GB"/>
+              <a:t>without configuration</a:t>
+            </a:r>
+            <a:endParaRPr lang="en-GB" dirty="0"/>
+          </a:p>
+          <a:p>
+            <a:r>
+              <a:rPr lang="en-US" dirty="0"/>
+              <a:t>One can create custom rules as well: </a:t>
+            </a:r>
+            <a:r>
+              <a:rPr lang="en-US" dirty="0">
+                <a:hlinkClick r:id="rId3"/>
+              </a:rPr>
+              <a:t>Creating custom rules - PowerShell | Microsoft Learn</a:t>
+            </a:r>
             <a:endParaRPr lang="en-US" dirty="0"/>
           </a:p>
-        </p:txBody>
-      </p:sp>
-      <p:sp>
-        <p:nvSpPr>
-          <p:cNvPr id="24" name="Slide Number Placeholder 23">
-            <a:extLst>
-              <a:ext uri="{FF2B5EF4-FFF2-40B4-BE49-F238E27FC236}">
-                <a16:creationId xmlns:a16="http://schemas.microsoft.com/office/drawing/2014/main" id="{5D838446-B95D-4AB7-B8CA-D5804BB79A11}"/>
+          <a:p>
+            <a:endParaRPr lang="en-US" dirty="0"/>
+          </a:p>
+        </p:txBody>
+      </p:sp>
+      <p:sp>
+        <p:nvSpPr>
+          <p:cNvPr id="9" name="Date Placeholder 8">
+            <a:extLst>
+              <a:ext uri="{FF2B5EF4-FFF2-40B4-BE49-F238E27FC236}">
+                <a16:creationId xmlns:a16="http://schemas.microsoft.com/office/drawing/2014/main" id="{D45C472E-4078-40A0-83A2-652E8356EDCB}"/>
+              </a:ext>
+            </a:extLst>
+          </p:cNvPr>
+          <p:cNvSpPr>
+            <a:spLocks noGrp="1"/>
+          </p:cNvSpPr>
+          <p:nvPr>
+            <p:ph type="dt" sz="half" idx="10"/>
+          </p:nvPr>
+        </p:nvSpPr>
+        <p:spPr/>
+        <p:txBody>
+          <a:bodyPr/>
+          <a:lstStyle/>
+          <a:p>
+            <a:endParaRPr lang="en-US" dirty="0"/>
+          </a:p>
+        </p:txBody>
+      </p:sp>
+      <p:sp>
+        <p:nvSpPr>
+          <p:cNvPr id="10" name="Footer Placeholder 9">
+            <a:extLst>
+              <a:ext uri="{FF2B5EF4-FFF2-40B4-BE49-F238E27FC236}">
+                <a16:creationId xmlns:a16="http://schemas.microsoft.com/office/drawing/2014/main" id="{A8C7C3A0-5E78-49C8-B8D4-F3DF62B2BC93}"/>
+              </a:ext>
+            </a:extLst>
+          </p:cNvPr>
+          <p:cNvSpPr>
+            <a:spLocks noGrp="1"/>
+          </p:cNvSpPr>
+          <p:nvPr>
+            <p:ph type="ftr" sz="quarter" idx="11"/>
+          </p:nvPr>
+        </p:nvSpPr>
+        <p:spPr/>
+        <p:txBody>
+          <a:bodyPr/>
+          <a:lstStyle/>
+          <a:p>
+            <a:endParaRPr lang="en-US" dirty="0"/>
+          </a:p>
+        </p:txBody>
+      </p:sp>
+      <p:sp>
+        <p:nvSpPr>
+          <p:cNvPr id="11" name="Slide Number Placeholder 10">
+            <a:extLst>
+              <a:ext uri="{FF2B5EF4-FFF2-40B4-BE49-F238E27FC236}">
+                <a16:creationId xmlns:a16="http://schemas.microsoft.com/office/drawing/2014/main" id="{56AE2454-CE9A-4A6B-AB5A-349E0D967654}"/>
               </a:ext>
             </a:extLst>
           </p:cNvPr>
@@ -12975,181 +13002,10 @@
           </a:p>
         </p:txBody>
       </p:sp>
-      <p:sp>
-        <p:nvSpPr>
-          <p:cNvPr id="23" name="Footer Placeholder 22">
-            <a:extLst>
-              <a:ext uri="{FF2B5EF4-FFF2-40B4-BE49-F238E27FC236}">
-                <a16:creationId xmlns:a16="http://schemas.microsoft.com/office/drawing/2014/main" id="{DE8D546E-0F46-4CC0-B2B1-8B2430D00C0C}"/>
-              </a:ext>
-            </a:extLst>
-          </p:cNvPr>
-          <p:cNvSpPr>
-            <a:spLocks noGrp="1"/>
-          </p:cNvSpPr>
-          <p:nvPr>
-            <p:ph type="ftr" sz="quarter" idx="11"/>
-          </p:nvPr>
-        </p:nvSpPr>
-        <p:spPr/>
-        <p:txBody>
-          <a:bodyPr/>
-          <a:lstStyle/>
-          <a:p>
-            <a:r>
-              <a:rPr lang="en-US" dirty="0"/>
-              <a:t>Presentation Title</a:t>
-            </a:r>
-          </a:p>
-        </p:txBody>
-      </p:sp>
-      <p:sp>
-        <p:nvSpPr>
-          <p:cNvPr id="6" name="Title 5">
-            <a:extLst>
-              <a:ext uri="{FF2B5EF4-FFF2-40B4-BE49-F238E27FC236}">
-                <a16:creationId xmlns:a16="http://schemas.microsoft.com/office/drawing/2014/main" id="{FF777B66-94CB-491C-AC6B-BDAC98E21D57}"/>
-              </a:ext>
-            </a:extLst>
-          </p:cNvPr>
-          <p:cNvSpPr>
-            <a:spLocks noGrp="1"/>
-          </p:cNvSpPr>
-          <p:nvPr>
-            <p:ph type="title"/>
-          </p:nvPr>
-        </p:nvSpPr>
-        <p:spPr/>
-        <p:txBody>
-          <a:bodyPr/>
-          <a:lstStyle/>
-          <a:p>
-            <a:r>
-              <a:rPr lang="en-US" dirty="0"/>
-              <a:t>Thank you</a:t>
-            </a:r>
-          </a:p>
-        </p:txBody>
-      </p:sp>
-      <p:sp>
-        <p:nvSpPr>
-          <p:cNvPr id="7" name="Text Placeholder 6">
-            <a:extLst>
-              <a:ext uri="{FF2B5EF4-FFF2-40B4-BE49-F238E27FC236}">
-                <a16:creationId xmlns:a16="http://schemas.microsoft.com/office/drawing/2014/main" id="{42AF1107-8D35-4E35-93C7-D3640946F742}"/>
-              </a:ext>
-            </a:extLst>
-          </p:cNvPr>
-          <p:cNvSpPr>
-            <a:spLocks noGrp="1"/>
-          </p:cNvSpPr>
-          <p:nvPr>
-            <p:ph type="body" sz="quarter" idx="13"/>
-          </p:nvPr>
-        </p:nvSpPr>
-        <p:spPr/>
-        <p:txBody>
-          <a:bodyPr/>
-          <a:lstStyle/>
-          <a:p>
-            <a:r>
-              <a:rPr lang="en-US" dirty="0"/>
-              <a:t>Christoph Bergmeister</a:t>
-            </a:r>
-          </a:p>
-          <a:p>
-            <a:r>
-              <a:rPr lang="en-US" dirty="0"/>
-              <a:t>Twitter: @CBergmeister</a:t>
-            </a:r>
-          </a:p>
-          <a:p>
-            <a:r>
-              <a:rPr lang="en-US" dirty="0"/>
-              <a:t>GitHub: @bergmeister</a:t>
-            </a:r>
-          </a:p>
-          <a:p>
-            <a:endParaRPr lang="en-US" dirty="0"/>
-          </a:p>
-        </p:txBody>
-      </p:sp>
-      <p:sp>
-        <p:nvSpPr>
-          <p:cNvPr id="3" name="Picture Placeholder 2">
-            <a:extLst>
-              <a:ext uri="{FF2B5EF4-FFF2-40B4-BE49-F238E27FC236}">
-                <a16:creationId xmlns:a16="http://schemas.microsoft.com/office/drawing/2014/main" id="{D056A619-E316-95FF-8EE4-678C34948990}"/>
-              </a:ext>
-            </a:extLst>
-          </p:cNvPr>
-          <p:cNvSpPr>
-            <a:spLocks noGrp="1"/>
-          </p:cNvSpPr>
-          <p:nvPr>
-            <p:ph type="pic" sz="quarter" idx="14"/>
-          </p:nvPr>
-        </p:nvSpPr>
-        <p:spPr/>
-      </p:sp>
-      <p:sp>
-        <p:nvSpPr>
-          <p:cNvPr id="5" name="Picture Placeholder 4">
-            <a:extLst>
-              <a:ext uri="{FF2B5EF4-FFF2-40B4-BE49-F238E27FC236}">
-                <a16:creationId xmlns:a16="http://schemas.microsoft.com/office/drawing/2014/main" id="{84726F0C-D5C9-BA04-6838-DB6D3216D251}"/>
-              </a:ext>
-            </a:extLst>
-          </p:cNvPr>
-          <p:cNvSpPr>
-            <a:spLocks noGrp="1"/>
-          </p:cNvSpPr>
-          <p:nvPr>
-            <p:ph type="pic" sz="quarter" idx="17"/>
-          </p:nvPr>
-        </p:nvSpPr>
-        <p:spPr/>
-      </p:sp>
-      <p:sp>
-        <p:nvSpPr>
-          <p:cNvPr id="10" name="Picture Placeholder 9">
-            <a:extLst>
-              <a:ext uri="{FF2B5EF4-FFF2-40B4-BE49-F238E27FC236}">
-                <a16:creationId xmlns:a16="http://schemas.microsoft.com/office/drawing/2014/main" id="{571DBADF-C411-45E3-D237-F6564040EFB6}"/>
-              </a:ext>
-            </a:extLst>
-          </p:cNvPr>
-          <p:cNvSpPr>
-            <a:spLocks noGrp="1"/>
-          </p:cNvSpPr>
-          <p:nvPr>
-            <p:ph type="pic" sz="quarter" idx="15"/>
-          </p:nvPr>
-        </p:nvSpPr>
-        <p:spPr/>
-      </p:sp>
-      <p:sp>
-        <p:nvSpPr>
-          <p:cNvPr id="14" name="Picture Placeholder 13">
-            <a:extLst>
-              <a:ext uri="{FF2B5EF4-FFF2-40B4-BE49-F238E27FC236}">
-                <a16:creationId xmlns:a16="http://schemas.microsoft.com/office/drawing/2014/main" id="{864CF710-C84E-88E1-6663-D129C38F62F9}"/>
-              </a:ext>
-            </a:extLst>
-          </p:cNvPr>
-          <p:cNvSpPr>
-            <a:spLocks noGrp="1"/>
-          </p:cNvSpPr>
-          <p:nvPr>
-            <p:ph type="pic" sz="quarter" idx="16"/>
-          </p:nvPr>
-        </p:nvSpPr>
-        <p:spPr/>
-      </p:sp>
     </p:spTree>
     <p:extLst>
       <p:ext uri="{BB962C8B-B14F-4D97-AF65-F5344CB8AC3E}">
-        <p14:creationId xmlns:p14="http://schemas.microsoft.com/office/powerpoint/2010/main" val="927313156"/>
+        <p14:creationId xmlns:p14="http://schemas.microsoft.com/office/powerpoint/2010/main" val="256130368"/>
       </p:ext>
     </p:extLst>
   </p:cSld>
@@ -13245,6 +13101,18 @@
             <a:pPr algn="r"/>
             <a:r>
               <a:rPr lang="en-US" dirty="0"/>
+              <a:t>Templates</a:t>
+            </a:r>
+            <a:endParaRPr lang="en-US" sz="1800" dirty="0">
+              <a:solidFill>
+                <a:schemeClr val="bg1"/>
+              </a:solidFill>
+            </a:endParaRPr>
+          </a:p>
+          <a:p>
+            <a:pPr algn="r"/>
+            <a:r>
+              <a:rPr lang="en-US" dirty="0"/>
               <a:t>Debugging</a:t>
             </a:r>
           </a:p>
@@ -13352,7 +13220,7 @@
           <a:p>
             <a:r>
               <a:rPr lang="en-US" dirty="0"/>
-              <a:t>02/03/2023</a:t>
+              <a:t>27/03/2023</a:t>
             </a:r>
           </a:p>
         </p:txBody>
@@ -13427,6 +13295,262 @@
     <p:extLst>
       <p:ext uri="{BB962C8B-B14F-4D97-AF65-F5344CB8AC3E}">
         <p14:creationId xmlns:p14="http://schemas.microsoft.com/office/powerpoint/2010/main" val="1613598062"/>
+      </p:ext>
+    </p:extLst>
+  </p:cSld>
+  <p:clrMapOvr>
+    <a:masterClrMapping/>
+  </p:clrMapOvr>
+</p:sld>
+</file>
+
+<file path=ppt/slides/slide20.xml><?xml version="1.0" encoding="utf-8"?>
+<p:sld xmlns:a="http://schemas.openxmlformats.org/drawingml/2006/main" xmlns:r="http://schemas.openxmlformats.org/officeDocument/2006/relationships" xmlns:p="http://schemas.openxmlformats.org/presentationml/2006/main">
+  <p:cSld>
+    <p:spTree>
+      <p:nvGrpSpPr>
+        <p:cNvPr id="1" name=""/>
+        <p:cNvGrpSpPr/>
+        <p:nvPr/>
+      </p:nvGrpSpPr>
+      <p:grpSpPr>
+        <a:xfrm>
+          <a:off x="0" y="0"/>
+          <a:ext cx="0" cy="0"/>
+          <a:chOff x="0" y="0"/>
+          <a:chExt cx="0" cy="0"/>
+        </a:xfrm>
+      </p:grpSpPr>
+      <p:sp>
+        <p:nvSpPr>
+          <p:cNvPr id="22" name="Date Placeholder 21">
+            <a:extLst>
+              <a:ext uri="{FF2B5EF4-FFF2-40B4-BE49-F238E27FC236}">
+                <a16:creationId xmlns:a16="http://schemas.microsoft.com/office/drawing/2014/main" id="{692474E6-3035-46B8-9C05-9B4204E8ED39}"/>
+              </a:ext>
+            </a:extLst>
+          </p:cNvPr>
+          <p:cNvSpPr>
+            <a:spLocks noGrp="1"/>
+          </p:cNvSpPr>
+          <p:nvPr>
+            <p:ph type="dt" sz="half" idx="10"/>
+          </p:nvPr>
+        </p:nvSpPr>
+        <p:spPr/>
+        <p:txBody>
+          <a:bodyPr/>
+          <a:lstStyle/>
+          <a:p>
+            <a:endParaRPr lang="en-US" dirty="0"/>
+          </a:p>
+        </p:txBody>
+      </p:sp>
+      <p:sp>
+        <p:nvSpPr>
+          <p:cNvPr id="24" name="Slide Number Placeholder 23">
+            <a:extLst>
+              <a:ext uri="{FF2B5EF4-FFF2-40B4-BE49-F238E27FC236}">
+                <a16:creationId xmlns:a16="http://schemas.microsoft.com/office/drawing/2014/main" id="{5D838446-B95D-4AB7-B8CA-D5804BB79A11}"/>
+              </a:ext>
+            </a:extLst>
+          </p:cNvPr>
+          <p:cNvSpPr>
+            <a:spLocks noGrp="1"/>
+          </p:cNvSpPr>
+          <p:nvPr>
+            <p:ph type="sldNum" sz="quarter" idx="12"/>
+          </p:nvPr>
+        </p:nvSpPr>
+        <p:spPr/>
+        <p:txBody>
+          <a:bodyPr/>
+          <a:lstStyle/>
+          <a:p>
+            <a:fld id="{D8DA9DAA-006C-4F4B-980E-E3DF019B24E2}" type="slidenum">
+              <a:rPr lang="en-US" smtClean="0"/>
+              <a:pPr/>
+              <a:t>20</a:t>
+            </a:fld>
+            <a:endParaRPr lang="en-US" dirty="0"/>
+          </a:p>
+        </p:txBody>
+      </p:sp>
+      <p:sp>
+        <p:nvSpPr>
+          <p:cNvPr id="23" name="Footer Placeholder 22">
+            <a:extLst>
+              <a:ext uri="{FF2B5EF4-FFF2-40B4-BE49-F238E27FC236}">
+                <a16:creationId xmlns:a16="http://schemas.microsoft.com/office/drawing/2014/main" id="{DE8D546E-0F46-4CC0-B2B1-8B2430D00C0C}"/>
+              </a:ext>
+            </a:extLst>
+          </p:cNvPr>
+          <p:cNvSpPr>
+            <a:spLocks noGrp="1"/>
+          </p:cNvSpPr>
+          <p:nvPr>
+            <p:ph type="ftr" sz="quarter" idx="11"/>
+          </p:nvPr>
+        </p:nvSpPr>
+        <p:spPr/>
+        <p:txBody>
+          <a:bodyPr/>
+          <a:lstStyle/>
+          <a:p>
+            <a:r>
+              <a:rPr lang="en-US" dirty="0"/>
+              <a:t>Presentation Title</a:t>
+            </a:r>
+          </a:p>
+        </p:txBody>
+      </p:sp>
+      <p:sp>
+        <p:nvSpPr>
+          <p:cNvPr id="6" name="Title 5">
+            <a:extLst>
+              <a:ext uri="{FF2B5EF4-FFF2-40B4-BE49-F238E27FC236}">
+                <a16:creationId xmlns:a16="http://schemas.microsoft.com/office/drawing/2014/main" id="{FF777B66-94CB-491C-AC6B-BDAC98E21D57}"/>
+              </a:ext>
+            </a:extLst>
+          </p:cNvPr>
+          <p:cNvSpPr>
+            <a:spLocks noGrp="1"/>
+          </p:cNvSpPr>
+          <p:nvPr>
+            <p:ph type="title"/>
+          </p:nvPr>
+        </p:nvSpPr>
+        <p:spPr/>
+        <p:txBody>
+          <a:bodyPr/>
+          <a:lstStyle/>
+          <a:p>
+            <a:r>
+              <a:rPr lang="en-US" dirty="0"/>
+              <a:t>Thank you</a:t>
+            </a:r>
+          </a:p>
+        </p:txBody>
+      </p:sp>
+      <p:sp>
+        <p:nvSpPr>
+          <p:cNvPr id="7" name="Text Placeholder 6">
+            <a:extLst>
+              <a:ext uri="{FF2B5EF4-FFF2-40B4-BE49-F238E27FC236}">
+                <a16:creationId xmlns:a16="http://schemas.microsoft.com/office/drawing/2014/main" id="{42AF1107-8D35-4E35-93C7-D3640946F742}"/>
+              </a:ext>
+            </a:extLst>
+          </p:cNvPr>
+          <p:cNvSpPr>
+            <a:spLocks noGrp="1"/>
+          </p:cNvSpPr>
+          <p:nvPr>
+            <p:ph type="body" sz="quarter" idx="13"/>
+          </p:nvPr>
+        </p:nvSpPr>
+        <p:spPr/>
+        <p:txBody>
+          <a:bodyPr/>
+          <a:lstStyle/>
+          <a:p>
+            <a:r>
+              <a:rPr lang="en-US" dirty="0"/>
+              <a:t>Christoph Bergmeister</a:t>
+            </a:r>
+          </a:p>
+          <a:p>
+            <a:r>
+              <a:rPr lang="en-US" dirty="0"/>
+              <a:t>Twitter: @CBergmeister</a:t>
+            </a:r>
+          </a:p>
+          <a:p>
+            <a:r>
+              <a:rPr lang="en-US" dirty="0"/>
+              <a:t>GitHub: @bergmeister</a:t>
+            </a:r>
+          </a:p>
+          <a:p>
+            <a:endParaRPr lang="en-US" dirty="0"/>
+          </a:p>
+        </p:txBody>
+      </p:sp>
+      <p:sp>
+        <p:nvSpPr>
+          <p:cNvPr id="3" name="Picture Placeholder 2">
+            <a:extLst>
+              <a:ext uri="{FF2B5EF4-FFF2-40B4-BE49-F238E27FC236}">
+                <a16:creationId xmlns:a16="http://schemas.microsoft.com/office/drawing/2014/main" id="{D056A619-E316-95FF-8EE4-678C34948990}"/>
+              </a:ext>
+            </a:extLst>
+          </p:cNvPr>
+          <p:cNvSpPr>
+            <a:spLocks noGrp="1"/>
+          </p:cNvSpPr>
+          <p:nvPr>
+            <p:ph type="pic" sz="quarter" idx="14"/>
+          </p:nvPr>
+        </p:nvSpPr>
+        <p:spPr/>
+      </p:sp>
+      <p:sp>
+        <p:nvSpPr>
+          <p:cNvPr id="5" name="Picture Placeholder 4">
+            <a:extLst>
+              <a:ext uri="{FF2B5EF4-FFF2-40B4-BE49-F238E27FC236}">
+                <a16:creationId xmlns:a16="http://schemas.microsoft.com/office/drawing/2014/main" id="{84726F0C-D5C9-BA04-6838-DB6D3216D251}"/>
+              </a:ext>
+            </a:extLst>
+          </p:cNvPr>
+          <p:cNvSpPr>
+            <a:spLocks noGrp="1"/>
+          </p:cNvSpPr>
+          <p:nvPr>
+            <p:ph type="pic" sz="quarter" idx="17"/>
+          </p:nvPr>
+        </p:nvSpPr>
+        <p:spPr/>
+      </p:sp>
+      <p:sp>
+        <p:nvSpPr>
+          <p:cNvPr id="10" name="Picture Placeholder 9">
+            <a:extLst>
+              <a:ext uri="{FF2B5EF4-FFF2-40B4-BE49-F238E27FC236}">
+                <a16:creationId xmlns:a16="http://schemas.microsoft.com/office/drawing/2014/main" id="{571DBADF-C411-45E3-D237-F6564040EFB6}"/>
+              </a:ext>
+            </a:extLst>
+          </p:cNvPr>
+          <p:cNvSpPr>
+            <a:spLocks noGrp="1"/>
+          </p:cNvSpPr>
+          <p:nvPr>
+            <p:ph type="pic" sz="quarter" idx="15"/>
+          </p:nvPr>
+        </p:nvSpPr>
+        <p:spPr/>
+      </p:sp>
+      <p:sp>
+        <p:nvSpPr>
+          <p:cNvPr id="14" name="Picture Placeholder 13">
+            <a:extLst>
+              <a:ext uri="{FF2B5EF4-FFF2-40B4-BE49-F238E27FC236}">
+                <a16:creationId xmlns:a16="http://schemas.microsoft.com/office/drawing/2014/main" id="{864CF710-C84E-88E1-6663-D129C38F62F9}"/>
+              </a:ext>
+            </a:extLst>
+          </p:cNvPr>
+          <p:cNvSpPr>
+            <a:spLocks noGrp="1"/>
+          </p:cNvSpPr>
+          <p:nvPr>
+            <p:ph type="pic" sz="quarter" idx="16"/>
+          </p:nvPr>
+        </p:nvSpPr>
+        <p:spPr/>
+      </p:sp>
+    </p:spTree>
+    <p:extLst>
+      <p:ext uri="{BB962C8B-B14F-4D97-AF65-F5344CB8AC3E}">
+        <p14:creationId xmlns:p14="http://schemas.microsoft.com/office/powerpoint/2010/main" val="927313156"/>
       </p:ext>
     </p:extLst>
   </p:cSld>
@@ -14235,9 +14359,16 @@
             <p:ph type="ctrTitle"/>
           </p:nvPr>
         </p:nvSpPr>
-        <p:spPr/>
-        <p:txBody>
-          <a:bodyPr/>
+        <p:spPr>
+          <a:xfrm>
+            <a:off x="1523999" y="1463040"/>
+            <a:ext cx="9419303" cy="2340864"/>
+          </a:xfrm>
+        </p:spPr>
+        <p:txBody>
+          <a:bodyPr>
+            <a:normAutofit fontScale="90000"/>
+          </a:bodyPr>
           <a:lstStyle/>
           <a:p>
             <a:r>
@@ -14247,7 +14378,7 @@
                 </a:solidFill>
                 <a:latin typeface="+mn-lt"/>
               </a:rPr>
-              <a:t>DEBUGGING</a:t>
+              <a:t>TEMPLATES, COMMANDS,</a:t>
             </a:r>
             <a:br>
               <a:rPr lang="en-US" b="1" cap="all" spc="400" dirty="0">
@@ -14264,6 +14395,23 @@
                 </a:solidFill>
                 <a:latin typeface="+mn-lt"/>
               </a:rPr>
+              <a:t>Integrated Terminal</a:t>
+            </a:r>
+            <a:br>
+              <a:rPr lang="en-US" b="1" cap="all" spc="400" dirty="0">
+                <a:solidFill>
+                  <a:schemeClr val="bg1"/>
+                </a:solidFill>
+                <a:latin typeface="+mn-lt"/>
+              </a:rPr>
+            </a:br>
+            <a:r>
+              <a:rPr lang="en-US" b="1" cap="all" spc="400" dirty="0">
+                <a:solidFill>
+                  <a:schemeClr val="bg1"/>
+                </a:solidFill>
+                <a:latin typeface="+mn-lt"/>
+              </a:rPr>
               <a:t>DEMO</a:t>
             </a:r>
             <a:endParaRPr lang="en-US" dirty="0"/>
@@ -14293,106 +14441,6 @@
           </a:bodyPr>
           <a:lstStyle/>
           <a:p>
-            <a:r>
-              <a:rPr lang="en-US" sz="2400" dirty="0"/>
-              <a:t>Create </a:t>
-            </a:r>
-            <a:r>
-              <a:rPr lang="en-US" sz="2400" dirty="0" err="1"/>
-              <a:t>launch.json</a:t>
-            </a:r>
-            <a:r>
-              <a:rPr lang="en-US" sz="2400" dirty="0"/>
-              <a:t> from scratch</a:t>
-            </a:r>
-          </a:p>
-          <a:p>
-            <a:r>
-              <a:rPr lang="en-US" sz="2400" dirty="0"/>
-              <a:t>More sophisticated example: </a:t>
-            </a:r>
-            <a:r>
-              <a:rPr lang="en-GB" sz="2400" dirty="0" err="1">
-                <a:hlinkClick r:id="rId2"/>
-              </a:rPr>
-              <a:t>PSScriptAnalyzer</a:t>
-            </a:r>
-            <a:r>
-              <a:rPr lang="en-GB" sz="2400" dirty="0">
-                <a:hlinkClick r:id="rId2"/>
-              </a:rPr>
-              <a:t>/</a:t>
-            </a:r>
-            <a:r>
-              <a:rPr lang="en-GB" sz="2400" dirty="0" err="1">
-                <a:hlinkClick r:id="rId2"/>
-              </a:rPr>
-              <a:t>launch.json</a:t>
-            </a:r>
-            <a:r>
-              <a:rPr lang="en-GB" sz="2400" dirty="0">
-                <a:hlinkClick r:id="rId2"/>
-              </a:rPr>
-              <a:t> at master · PowerShell/</a:t>
-            </a:r>
-            <a:r>
-              <a:rPr lang="en-GB" sz="2400" dirty="0" err="1">
-                <a:hlinkClick r:id="rId2"/>
-              </a:rPr>
-              <a:t>PSScriptAnalyzer</a:t>
-            </a:r>
-            <a:r>
-              <a:rPr lang="en-GB" sz="2400" dirty="0">
-                <a:hlinkClick r:id="rId2"/>
-              </a:rPr>
-              <a:t> · GitHub</a:t>
-            </a:r>
-            <a:endParaRPr lang="en-GB" sz="2400" dirty="0"/>
-          </a:p>
-          <a:p>
-            <a:endParaRPr lang="en-GB" sz="2400" dirty="0"/>
-          </a:p>
-          <a:p>
-            <a:r>
-              <a:rPr lang="en-GB" sz="2400" dirty="0"/>
-              <a:t>All Demos at </a:t>
-            </a:r>
-            <a:r>
-              <a:rPr lang="en-GB" sz="2400" dirty="0" err="1">
-                <a:hlinkClick r:id="rId3"/>
-              </a:rPr>
-              <a:t>pssa</a:t>
-            </a:r>
-            <a:r>
-              <a:rPr lang="en-GB" sz="2400" dirty="0">
-                <a:hlinkClick r:id="rId3"/>
-              </a:rPr>
-              <a:t>-demo/1_DefaultExperience at main · </a:t>
-            </a:r>
-            <a:r>
-              <a:rPr lang="en-GB" sz="2400" dirty="0" err="1">
-                <a:hlinkClick r:id="rId3"/>
-              </a:rPr>
-              <a:t>bergmeister</a:t>
-            </a:r>
-            <a:r>
-              <a:rPr lang="en-GB" sz="2400" dirty="0">
-                <a:hlinkClick r:id="rId3"/>
-              </a:rPr>
-              <a:t>/</a:t>
-            </a:r>
-            <a:r>
-              <a:rPr lang="en-GB" sz="2400" dirty="0" err="1">
-                <a:hlinkClick r:id="rId3"/>
-              </a:rPr>
-              <a:t>pssa</a:t>
-            </a:r>
-            <a:r>
-              <a:rPr lang="en-GB" sz="2400" dirty="0">
-                <a:hlinkClick r:id="rId3"/>
-              </a:rPr>
-              <a:t>-demo (github.com)</a:t>
-            </a:r>
             <a:endParaRPr lang="en-US" sz="2400" dirty="0"/>
           </a:p>
         </p:txBody>
@@ -14455,7 +14503,7 @@
                 </a:solidFill>
                 <a:latin typeface="+mn-lt"/>
               </a:rPr>
-              <a:t>Settings</a:t>
+              <a:t>DEBUGGING</a:t>
             </a:r>
             <a:br>
               <a:rPr lang="en-US" b="1" cap="all" spc="400" dirty="0">
@@ -14502,60 +14550,113 @@
           <a:lstStyle/>
           <a:p>
             <a:r>
-              <a:rPr lang="en-US" sz="2800" dirty="0" err="1"/>
-              <a:t>settings.json</a:t>
-            </a:r>
-            <a:endParaRPr lang="en-US" sz="2800" dirty="0"/>
-          </a:p>
-          <a:p>
-            <a:r>
-              <a:rPr lang="en-US" sz="2800" dirty="0"/>
-              <a:t>Example: </a:t>
-            </a:r>
-            <a:r>
-              <a:rPr lang="en-GB" sz="2800" dirty="0" err="1">
+              <a:rPr lang="en-US" sz="2400" dirty="0"/>
+              <a:t>Create </a:t>
+            </a:r>
+            <a:r>
+              <a:rPr lang="en-US" sz="2400" dirty="0" err="1"/>
+              <a:t>launch.json</a:t>
+            </a:r>
+            <a:r>
+              <a:rPr lang="en-US" sz="2400" dirty="0"/>
+              <a:t> from scratch</a:t>
+            </a:r>
+          </a:p>
+          <a:p>
+            <a:r>
+              <a:rPr lang="en-US" sz="2400" dirty="0"/>
+              <a:t>More sophisticated example: </a:t>
+            </a:r>
+            <a:r>
+              <a:rPr lang="en-GB" sz="2400" dirty="0" err="1">
                 <a:hlinkClick r:id="rId2"/>
               </a:rPr>
               <a:t>PSScriptAnalyzer</a:t>
             </a:r>
             <a:r>
-              <a:rPr lang="en-GB" sz="2800" dirty="0">
+              <a:rPr lang="en-GB" sz="2400" dirty="0">
                 <a:hlinkClick r:id="rId2"/>
               </a:rPr>
               <a:t>/</a:t>
             </a:r>
             <a:r>
-              <a:rPr lang="en-GB" sz="2800" dirty="0" err="1">
+              <a:rPr lang="en-GB" sz="2400" dirty="0" err="1">
                 <a:hlinkClick r:id="rId2"/>
               </a:rPr>
-              <a:t>settings.json</a:t>
-            </a:r>
-            <a:r>
-              <a:rPr lang="en-GB" sz="2800" dirty="0">
+              <a:t>launch.json</a:t>
+            </a:r>
+            <a:r>
+              <a:rPr lang="en-GB" sz="2400" dirty="0">
                 <a:hlinkClick r:id="rId2"/>
               </a:rPr>
               <a:t> at master · PowerShell/</a:t>
             </a:r>
             <a:r>
-              <a:rPr lang="en-GB" sz="2800" dirty="0" err="1">
+              <a:rPr lang="en-GB" sz="2400" dirty="0" err="1">
                 <a:hlinkClick r:id="rId2"/>
               </a:rPr>
               <a:t>PSScriptAnalyzer</a:t>
             </a:r>
             <a:r>
-              <a:rPr lang="en-GB" sz="2800" dirty="0">
+              <a:rPr lang="en-GB" sz="2400" dirty="0">
                 <a:hlinkClick r:id="rId2"/>
               </a:rPr>
               <a:t> · GitHub</a:t>
             </a:r>
-            <a:endParaRPr lang="en-US" sz="2800" dirty="0"/>
+            <a:endParaRPr lang="en-GB" sz="2400" dirty="0"/>
+          </a:p>
+          <a:p>
+            <a:endParaRPr lang="en-GB" sz="2400" dirty="0"/>
+          </a:p>
+          <a:p>
+            <a:r>
+              <a:rPr lang="en-GB" sz="2400" dirty="0"/>
+              <a:t>All Demos at </a:t>
+            </a:r>
+            <a:r>
+              <a:rPr lang="en-GB" sz="2400" dirty="0" err="1">
+                <a:hlinkClick r:id="rId3"/>
+              </a:rPr>
+              <a:t>pssa</a:t>
+            </a:r>
+            <a:r>
+              <a:rPr lang="en-GB" sz="2400" dirty="0">
+                <a:hlinkClick r:id="rId3"/>
+              </a:rPr>
+              <a:t>-demo/1_DefaultExperience at main · </a:t>
+            </a:r>
+            <a:r>
+              <a:rPr lang="en-GB" sz="2400" dirty="0" err="1">
+                <a:hlinkClick r:id="rId3"/>
+              </a:rPr>
+              <a:t>bergmeister</a:t>
+            </a:r>
+            <a:r>
+              <a:rPr lang="en-GB" sz="2400" dirty="0">
+                <a:hlinkClick r:id="rId3"/>
+              </a:rPr>
+              <a:t>/</a:t>
+            </a:r>
+            <a:r>
+              <a:rPr lang="en-GB" sz="2400" dirty="0" err="1">
+                <a:hlinkClick r:id="rId3"/>
+              </a:rPr>
+              <a:t>pssa</a:t>
+            </a:r>
+            <a:r>
+              <a:rPr lang="en-GB" sz="2400" dirty="0">
+                <a:hlinkClick r:id="rId3"/>
+              </a:rPr>
+              <a:t>-demo (github.com)</a:t>
+            </a:r>
+            <a:endParaRPr lang="en-US" sz="2400" dirty="0"/>
           </a:p>
         </p:txBody>
       </p:sp>
     </p:spTree>
     <p:extLst>
       <p:ext uri="{BB962C8B-B14F-4D97-AF65-F5344CB8AC3E}">
-        <p14:creationId xmlns:p14="http://schemas.microsoft.com/office/powerpoint/2010/main" val="1008075256"/>
+        <p14:creationId xmlns:p14="http://schemas.microsoft.com/office/powerpoint/2010/main" val="1841097311"/>
       </p:ext>
     </p:extLst>
   </p:cSld>
@@ -14610,7 +14711,7 @@
                 </a:solidFill>
                 <a:latin typeface="+mn-lt"/>
               </a:rPr>
-              <a:t>Testing</a:t>
+              <a:t>Settings</a:t>
             </a:r>
             <a:br>
               <a:rPr lang="en-US" b="1" cap="all" spc="400" dirty="0">
@@ -14652,21 +14753,65 @@
         <p:spPr/>
         <p:txBody>
           <a:bodyPr>
-            <a:normAutofit/>
+            <a:noAutofit/>
           </a:bodyPr>
           <a:lstStyle/>
           <a:p>
             <a:r>
+              <a:rPr lang="en-US" sz="2800" dirty="0" err="1"/>
+              <a:t>settings.json</a:t>
+            </a:r>
+            <a:endParaRPr lang="en-US" sz="2800" dirty="0"/>
+          </a:p>
+          <a:p>
+            <a:r>
               <a:rPr lang="en-US" sz="2800" dirty="0"/>
-              <a:t>Running Pester</a:t>
-            </a:r>
+              <a:t>Example: </a:t>
+            </a:r>
+            <a:r>
+              <a:rPr lang="en-GB" sz="2800" dirty="0" err="1">
+                <a:hlinkClick r:id="rId2"/>
+              </a:rPr>
+              <a:t>PSScriptAnalyzer</a:t>
+            </a:r>
+            <a:r>
+              <a:rPr lang="en-GB" sz="2800" dirty="0">
+                <a:hlinkClick r:id="rId2"/>
+              </a:rPr>
+              <a:t>/</a:t>
+            </a:r>
+            <a:r>
+              <a:rPr lang="en-GB" sz="2800" dirty="0" err="1">
+                <a:hlinkClick r:id="rId2"/>
+              </a:rPr>
+              <a:t>settings.json</a:t>
+            </a:r>
+            <a:r>
+              <a:rPr lang="en-GB" sz="2800" dirty="0">
+                <a:hlinkClick r:id="rId2"/>
+              </a:rPr>
+              <a:t> at master · PowerShell/</a:t>
+            </a:r>
+            <a:r>
+              <a:rPr lang="en-GB" sz="2800" dirty="0" err="1">
+                <a:hlinkClick r:id="rId2"/>
+              </a:rPr>
+              <a:t>PSScriptAnalyzer</a:t>
+            </a:r>
+            <a:r>
+              <a:rPr lang="en-GB" sz="2800" dirty="0">
+                <a:hlinkClick r:id="rId2"/>
+              </a:rPr>
+              <a:t> · GitHub</a:t>
+            </a:r>
+            <a:endParaRPr lang="en-US" sz="2800" dirty="0"/>
           </a:p>
         </p:txBody>
       </p:sp>
     </p:spTree>
     <p:extLst>
       <p:ext uri="{BB962C8B-B14F-4D97-AF65-F5344CB8AC3E}">
-        <p14:creationId xmlns:p14="http://schemas.microsoft.com/office/powerpoint/2010/main" val="3260804842"/>
+        <p14:creationId xmlns:p14="http://schemas.microsoft.com/office/powerpoint/2010/main" val="1008075256"/>
       </p:ext>
     </p:extLst>
   </p:cSld>
@@ -15182,6 +15327,15 @@
 </file>
 
 <file path=customXml/item2.xml><?xml version="1.0" encoding="utf-8"?>
+<?mso-contentType ?>
+<FormTemplates xmlns="http://schemas.microsoft.com/sharepoint/v3/contenttype/forms">
+  <Display>DocumentLibraryForm</Display>
+  <Edit>DocumentLibraryForm</Edit>
+  <New>DocumentLibraryForm</New>
+</FormTemplates>
+</file>
+
+<file path=customXml/item3.xml><?xml version="1.0" encoding="utf-8"?>
 <ct:contentTypeSchema xmlns:ct="http://schemas.microsoft.com/office/2006/metadata/contentType" xmlns:ma="http://schemas.microsoft.com/office/2006/metadata/properties/metaAttributes" ct:_="" ma:_="" ma:contentTypeName="Document" ma:contentTypeID="0x01010079F111ED35F8CC479449609E8A0923A6" ma:contentTypeVersion="12" ma:contentTypeDescription="Create a new document." ma:contentTypeScope="" ma:versionID="426e97fa315356fffbdcd9876fe988c2">
   <xsd:schema xmlns:xsd="http://www.w3.org/2001/XMLSchema" xmlns:xs="http://www.w3.org/2001/XMLSchema" xmlns:p="http://schemas.microsoft.com/office/2006/metadata/properties" xmlns:ns2="71af3243-3dd4-4a8d-8c0d-dd76da1f02a5" xmlns:ns3="16c05727-aa75-4e4a-9b5f-8a80a1165891" targetNamespace="http://schemas.microsoft.com/office/2006/metadata/properties" ma:root="true" ma:fieldsID="14b8f0def80e6d70ce3def20c90759ae" ns2:_="" ns3:_="">
     <xsd:import namespace="71af3243-3dd4-4a8d-8c0d-dd76da1f02a5"/>
@@ -15402,15 +15556,6 @@
 </ct:contentTypeSchema>
 </file>
 
-<file path=customXml/item3.xml><?xml version="1.0" encoding="utf-8"?>
-<?mso-contentType ?>
-<FormTemplates xmlns="http://schemas.microsoft.com/sharepoint/v3/contenttype/forms">
-  <Display>DocumentLibraryForm</Display>
-  <Edit>DocumentLibraryForm</Edit>
-  <New>DocumentLibraryForm</New>
-</FormTemplates>
-</file>
-
 <file path=customXml/itemProps1.xml><?xml version="1.0" encoding="utf-8"?>
 <ds:datastoreItem xmlns:ds="http://schemas.openxmlformats.org/officeDocument/2006/customXml" ds:itemID="{99919F73-B6C2-4A43-95E2-833EC48925FE}">
   <ds:schemaRefs>
@@ -15422,6 +15567,14 @@
 </file>
 
 <file path=customXml/itemProps2.xml><?xml version="1.0" encoding="utf-8"?>
+<ds:datastoreItem xmlns:ds="http://schemas.openxmlformats.org/officeDocument/2006/customXml" ds:itemID="{3C8E00D1-8EA3-4E42-801D-0253E1EAFC21}">
+  <ds:schemaRefs>
+    <ds:schemaRef ds:uri="http://schemas.microsoft.com/sharepoint/v3/contenttype/forms"/>
+  </ds:schemaRefs>
+</ds:datastoreItem>
+</file>
+
+<file path=customXml/itemProps3.xml><?xml version="1.0" encoding="utf-8"?>
 <ds:datastoreItem xmlns:ds="http://schemas.openxmlformats.org/officeDocument/2006/customXml" ds:itemID="{ABC329F5-30EE-4BF7-AA2A-B837B51416B4}">
   <ds:schemaRefs>
     <ds:schemaRef ds:uri="http://schemas.microsoft.com/office/2006/metadata/contentType"/>
@@ -15440,14 +15593,6 @@
 </ds:datastoreItem>
 </file>
 
-<file path=customXml/itemProps3.xml><?xml version="1.0" encoding="utf-8"?>
-<ds:datastoreItem xmlns:ds="http://schemas.openxmlformats.org/officeDocument/2006/customXml" ds:itemID="{3C8E00D1-8EA3-4E42-801D-0253E1EAFC21}">
-  <ds:schemaRefs>
-    <ds:schemaRef ds:uri="http://schemas.microsoft.com/sharepoint/v3/contenttype/forms"/>
-  </ds:schemaRefs>
-</ds:datastoreItem>
-</file>
-
 <file path=docMetadata/LabelInfo.xml><?xml version="1.0" encoding="utf-8"?>
 <clbl:labelList xmlns:clbl="http://schemas.microsoft.com/office/2020/mipLabelMetadata">
   <clbl:label id="{5fae8262-b78e-4366-8929-a5d6aac95320}" enabled="1" method="Standard" siteId="{cf36141c-ddd7-45a7-b073-111f66d0b30c}" removed="0"/>

</xml_diff>